<commit_message>
staging content changes (-Andrew)
</commit_message>
<xml_diff>
--- a/pegasus/sites.v3/code.org/public/files/computer_science_advocacy.pptx
+++ b/pegasus/sites.v3/code.org/public/files/computer_science_advocacy.pptx
@@ -136,7 +136,7 @@
   </p:defaultTextStyle>
   <p:extLst>
     <p:ext uri="{EFAFB233-063F-42B5-8137-9DF3F51BA10A}">
-      <p15:sldGuideLst xmlns:p15="http://schemas.microsoft.com/office/powerpoint/2012/main" xmlns="">
+      <p15:sldGuideLst xmlns="" xmlns:p15="http://schemas.microsoft.com/office/powerpoint/2012/main">
         <p15:guide id="1" orient="horz" pos="331" userDrawn="1">
           <p15:clr>
             <a:srgbClr val="A4A3A4"/>
@@ -587,11 +587,11 @@
         </c:dLbls>
         <c:gapWidth val="150"/>
         <c:overlap val="100"/>
-        <c:axId val="2106935720"/>
-        <c:axId val="2083635528"/>
+        <c:axId val="2128625096"/>
+        <c:axId val="2128622024"/>
       </c:barChart>
       <c:catAx>
-        <c:axId val="2106935720"/>
+        <c:axId val="2128625096"/>
         <c:scaling>
           <c:orientation val="minMax"/>
         </c:scaling>
@@ -601,7 +601,7 @@
         <c:majorTickMark val="out"/>
         <c:minorTickMark val="none"/>
         <c:tickLblPos val="nextTo"/>
-        <c:crossAx val="2083635528"/>
+        <c:crossAx val="2128622024"/>
         <c:crosses val="autoZero"/>
         <c:auto val="1"/>
         <c:lblAlgn val="ctr"/>
@@ -609,7 +609,7 @@
         <c:noMultiLvlLbl val="0"/>
       </c:catAx>
       <c:valAx>
-        <c:axId val="2083635528"/>
+        <c:axId val="2128622024"/>
         <c:scaling>
           <c:orientation val="minMax"/>
         </c:scaling>
@@ -620,7 +620,7 @@
         <c:majorTickMark val="out"/>
         <c:minorTickMark val="none"/>
         <c:tickLblPos val="nextTo"/>
-        <c:crossAx val="2106935720"/>
+        <c:crossAx val="2128625096"/>
         <c:crosses val="autoZero"/>
         <c:crossBetween val="between"/>
       </c:valAx>
@@ -1183,7 +1183,7 @@
           <a:p>
             <a:fld id="{DBF07D2D-D193-49EA-AA40-D0161EE95780}" type="datetimeFigureOut">
               <a:rPr lang="en-US" smtClean="0"/>
-              <a:t>1/18/16</a:t>
+              <a:t>1/22/16</a:t>
             </a:fld>
             <a:endParaRPr lang="en-US"/>
           </a:p>
@@ -10853,7 +10853,7 @@
   </p:timing>
   <p:extLst mod="1">
     <p:ext uri="{DCECCB84-F9BA-43D5-87BE-67443E8EF086}">
-      <p15:sldGuideLst xmlns:p15="http://schemas.microsoft.com/office/powerpoint/2012/main" xmlns=""/>
+      <p15:sldGuideLst xmlns="" xmlns:p15="http://schemas.microsoft.com/office/powerpoint/2012/main"/>
     </p:ext>
   </p:extLst>
 </p:sldLayout>
@@ -15986,7 +15986,7 @@
   </p:timing>
   <p:extLst mod="1">
     <p:ext uri="{DCECCB84-F9BA-43D5-87BE-67443E8EF086}">
-      <p15:sldGuideLst xmlns:p15="http://schemas.microsoft.com/office/powerpoint/2012/main" xmlns=""/>
+      <p15:sldGuideLst xmlns="" xmlns:p15="http://schemas.microsoft.com/office/powerpoint/2012/main"/>
     </p:ext>
   </p:extLst>
 </p:sldLayout>
@@ -24575,7 +24575,7 @@
   </p:timing>
   <p:extLst mod="1">
     <p:ext uri="{DCECCB84-F9BA-43D5-87BE-67443E8EF086}">
-      <p15:sldGuideLst xmlns:p15="http://schemas.microsoft.com/office/powerpoint/2012/main" xmlns=""/>
+      <p15:sldGuideLst xmlns="" xmlns:p15="http://schemas.microsoft.com/office/powerpoint/2012/main"/>
     </p:ext>
   </p:extLst>
 </p:sldLayout>
@@ -28535,7 +28535,7 @@
   </p:timing>
   <p:extLst mod="1">
     <p:ext uri="{DCECCB84-F9BA-43D5-87BE-67443E8EF086}">
-      <p15:sldGuideLst xmlns:p15="http://schemas.microsoft.com/office/powerpoint/2012/main" xmlns=""/>
+      <p15:sldGuideLst xmlns="" xmlns:p15="http://schemas.microsoft.com/office/powerpoint/2012/main"/>
     </p:ext>
   </p:extLst>
 </p:sldLayout>
@@ -32666,7 +32666,7 @@
   </p:timing>
   <p:extLst mod="1">
     <p:ext uri="{DCECCB84-F9BA-43D5-87BE-67443E8EF086}">
-      <p15:sldGuideLst xmlns:p15="http://schemas.microsoft.com/office/powerpoint/2012/main" xmlns=""/>
+      <p15:sldGuideLst xmlns="" xmlns:p15="http://schemas.microsoft.com/office/powerpoint/2012/main"/>
     </p:ext>
   </p:extLst>
 </p:sldLayout>
@@ -36666,7 +36666,7 @@
   </p:timing>
   <p:extLst mod="1">
     <p:ext uri="{DCECCB84-F9BA-43D5-87BE-67443E8EF086}">
-      <p15:sldGuideLst xmlns:p15="http://schemas.microsoft.com/office/powerpoint/2012/main" xmlns=""/>
+      <p15:sldGuideLst xmlns="" xmlns:p15="http://schemas.microsoft.com/office/powerpoint/2012/main"/>
     </p:ext>
   </p:extLst>
 </p:sldLayout>
@@ -41040,7 +41040,7 @@
   </p:txStyles>
   <p:extLst mod="1">
     <p:ext uri="{27BBF7A9-308A-43DC-89C8-2F10F3537804}">
-      <p15:sldGuideLst xmlns:p15="http://schemas.microsoft.com/office/powerpoint/2012/main" xmlns="">
+      <p15:sldGuideLst xmlns="" xmlns:p15="http://schemas.microsoft.com/office/powerpoint/2012/main">
         <p15:guide id="1" orient="horz" pos="59">
           <p15:clr>
             <a:srgbClr val="5ACBF0"/>
@@ -46764,18 +46764,7 @@
                 <a:ea typeface="Adobe Gothic Std B" panose="020B0800000000000000" pitchFamily="34" charset="-128"/>
                 <a:cs typeface="Arial"/>
               </a:rPr>
-              <a:t>71</a:t>
-            </a:r>
-            <a:r>
-              <a:rPr lang="en-US" sz="5400" dirty="0" smtClean="0">
-                <a:solidFill>
-                  <a:srgbClr val="000000"/>
-                </a:solidFill>
-                <a:latin typeface="Arial"/>
-                <a:ea typeface="Adobe Gothic Std B" panose="020B0800000000000000" pitchFamily="34" charset="-128"/>
-                <a:cs typeface="Arial"/>
-              </a:rPr>
-              <a:t>%</a:t>
+              <a:t>71%</a:t>
             </a:r>
             <a:endParaRPr lang="en-US" sz="5400" dirty="0">
               <a:solidFill>
@@ -49589,7 +49578,7 @@
         <p:spPr>
           <a:xfrm>
             <a:off x="381000" y="140807"/>
-            <a:ext cx="8280400" cy="879938"/>
+            <a:ext cx="8572500" cy="879938"/>
           </a:xfrm>
           <a:prstGeom prst="rect">
             <a:avLst/>
@@ -49655,19 +49644,16 @@
                 <a:ea typeface="Adobe Gothic Std B" panose="020B0800000000000000" pitchFamily="34" charset="-128"/>
                 <a:cs typeface="Arial"/>
               </a:rPr>
-              <a:t>28 </a:t>
+              <a:t>28 states + DC</a:t>
             </a:r>
-            <a:r>
-              <a:rPr lang="en-US" sz="3200" b="1" dirty="0">
-                <a:solidFill>
-                  <a:srgbClr val="7665A0"/>
-                </a:solidFill>
-                <a:latin typeface="Arial"/>
-                <a:ea typeface="Adobe Gothic Std B" panose="020B0800000000000000" pitchFamily="34" charset="-128"/>
-                <a:cs typeface="Arial"/>
-              </a:rPr>
-              <a:t>states</a:t>
-            </a:r>
+            <a:endParaRPr lang="en-US" sz="3200" b="1" dirty="0">
+              <a:solidFill>
+                <a:srgbClr val="7665A0"/>
+              </a:solidFill>
+              <a:latin typeface="Arial"/>
+              <a:ea typeface="Adobe Gothic Std B" panose="020B0800000000000000" pitchFamily="34" charset="-128"/>
+              <a:cs typeface="Arial"/>
+            </a:endParaRPr>
           </a:p>
           <a:p>
             <a:pPr>
@@ -49733,7 +49719,7 @@
               </a:lnSpc>
             </a:pPr>
             <a:r>
-              <a:rPr lang="en-US" sz="2000">
+              <a:rPr lang="en-US" sz="2000" dirty="0">
                 <a:solidFill>
                   <a:srgbClr val="000000"/>
                 </a:solidFill>
@@ -49744,7 +49730,7 @@
               <a:t>In </a:t>
             </a:r>
             <a:r>
-              <a:rPr lang="en-US" sz="2000" smtClean="0">
+              <a:rPr lang="en-US" sz="2000" dirty="0" smtClean="0">
                 <a:solidFill>
                   <a:srgbClr val="000000"/>
                 </a:solidFill>
@@ -49752,7 +49738,7 @@
                 <a:ea typeface="Adobe Gothic Std B" panose="020B0800000000000000" pitchFamily="34" charset="-128"/>
                 <a:cs typeface="Arial"/>
               </a:rPr>
-              <a:t>27 </a:t>
+              <a:t>28 </a:t>
             </a:r>
             <a:r>
               <a:rPr lang="en-US" sz="2000" dirty="0">
@@ -49774,21 +49760,10 @@
                 <a:ea typeface="Adobe Gothic Std B" panose="020B0800000000000000" pitchFamily="34" charset="-128"/>
                 <a:cs typeface="Arial"/>
               </a:rPr>
-              <a:t>up </a:t>
+              <a:t>up from </a:t>
             </a:r>
             <a:r>
-              <a:rPr lang="en-US" sz="2000" b="1">
-                <a:solidFill>
-                  <a:srgbClr val="000000"/>
-                </a:solidFill>
-                <a:latin typeface="Arial"/>
-                <a:ea typeface="Adobe Gothic Std B" panose="020B0800000000000000" pitchFamily="34" charset="-128"/>
-                <a:cs typeface="Arial"/>
-              </a:rPr>
-              <a:t>from </a:t>
-            </a:r>
-            <a:r>
-              <a:rPr lang="en-US" sz="2000" b="1" smtClean="0">
+              <a:rPr lang="en-US" sz="2000" b="1" dirty="0" smtClean="0">
                 <a:solidFill>
                   <a:srgbClr val="000000"/>
                 </a:solidFill>
@@ -54964,7 +54939,7 @@
   <a:extraClrSchemeLst/>
   <a:extLst>
     <a:ext uri="{05A4C25C-085E-4340-85A3-A5531E510DB2}">
-      <thm15:themeFamily xmlns:thm15="http://schemas.microsoft.com/office/thememl/2012/main" xmlns="" name="Office Theme" id="{62F939B6-93AF-4DB8-9C6B-D6C7DFDC589F}" vid="{4A3C46E8-61CC-4603-A589-7422A47A8E4A}"/>
+      <thm15:themeFamily xmlns="" xmlns:thm15="http://schemas.microsoft.com/office/thememl/2012/main" name="Office Theme" id="{62F939B6-93AF-4DB8-9C6B-D6C7DFDC589F}" vid="{4A3C46E8-61CC-4603-A589-7422A47A8E4A}"/>
     </a:ext>
   </a:extLst>
 </a:theme>
@@ -55266,7 +55241,7 @@
   <a:extraClrSchemeLst/>
   <a:extLst>
     <a:ext uri="{05A4C25C-085E-4340-85A3-A5531E510DB2}">
-      <thm15:themeFamily xmlns:thm15="http://schemas.microsoft.com/office/thememl/2012/main" xmlns="" name="SilverFox_Mentorship_Template" id="{726D2EC8-FE65-4BB6-9D87-EBBA7FA7A28A}" vid="{43A7A536-22B6-435A-A09C-B3CB1EAFEC96}"/>
+      <thm15:themeFamily xmlns="" xmlns:thm15="http://schemas.microsoft.com/office/thememl/2012/main" name="SilverFox_Mentorship_Template" id="{726D2EC8-FE65-4BB6-9D87-EBBA7FA7A28A}" vid="{43A7A536-22B6-435A-A09C-B3CB1EAFEC96}"/>
     </a:ext>
   </a:extLst>
 </a:theme>
@@ -55560,7 +55535,7 @@
   <a:extraClrSchemeLst/>
   <a:extLst>
     <a:ext uri="{05A4C25C-085E-4340-85A3-A5531E510DB2}">
-      <thm15:themeFamily xmlns:thm15="http://schemas.microsoft.com/office/thememl/2012/main" xmlns="" name="Office Theme" id="{62F939B6-93AF-4DB8-9C6B-D6C7DFDC589F}" vid="{4A3C46E8-61CC-4603-A589-7422A47A8E4A}"/>
+      <thm15:themeFamily xmlns="" xmlns:thm15="http://schemas.microsoft.com/office/thememl/2012/main" name="Office Theme" id="{62F939B6-93AF-4DB8-9C6B-D6C7DFDC589F}" vid="{4A3C46E8-61CC-4603-A589-7422A47A8E4A}"/>
     </a:ext>
   </a:extLst>
 </a:theme>
@@ -55821,7 +55796,7 @@
   <a:extraClrSchemeLst/>
   <a:extLst>
     <a:ext uri="{05A4C25C-085E-4340-85A3-A5531E510DB2}">
-      <thm15:themeFamily xmlns:thm15="http://schemas.microsoft.com/office/thememl/2012/main" xmlns="" name="Office Theme" id="{62F939B6-93AF-4DB8-9C6B-D6C7DFDC589F}" vid="{4A3C46E8-61CC-4603-A589-7422A47A8E4A}"/>
+      <thm15:themeFamily xmlns="" xmlns:thm15="http://schemas.microsoft.com/office/thememl/2012/main" name="Office Theme" id="{62F939B6-93AF-4DB8-9C6B-D6C7DFDC589F}" vid="{4A3C46E8-61CC-4603-A589-7422A47A8E4A}"/>
     </a:ext>
   </a:extLst>
 </a:theme>

</xml_diff>

<commit_message>
levelbuilder content changes (-Andrew)
</commit_message>
<xml_diff>
--- a/pegasus/sites.v3/code.org/public/files/computer_science_advocacy.pptx
+++ b/pegasus/sites.v3/code.org/public/files/computer_science_advocacy.pptx
@@ -136,7 +136,7 @@
   </p:defaultTextStyle>
   <p:extLst>
     <p:ext uri="{EFAFB233-063F-42B5-8137-9DF3F51BA10A}">
-      <p15:sldGuideLst xmlns:p15="http://schemas.microsoft.com/office/powerpoint/2012/main" xmlns="">
+      <p15:sldGuideLst xmlns="" xmlns:p15="http://schemas.microsoft.com/office/powerpoint/2012/main">
         <p15:guide id="1" orient="horz" pos="331" userDrawn="1">
           <p15:clr>
             <a:srgbClr val="A4A3A4"/>
@@ -587,11 +587,11 @@
         </c:dLbls>
         <c:gapWidth val="150"/>
         <c:overlap val="100"/>
-        <c:axId val="2106935720"/>
-        <c:axId val="2083635528"/>
+        <c:axId val="2128625096"/>
+        <c:axId val="2128622024"/>
       </c:barChart>
       <c:catAx>
-        <c:axId val="2106935720"/>
+        <c:axId val="2128625096"/>
         <c:scaling>
           <c:orientation val="minMax"/>
         </c:scaling>
@@ -601,7 +601,7 @@
         <c:majorTickMark val="out"/>
         <c:minorTickMark val="none"/>
         <c:tickLblPos val="nextTo"/>
-        <c:crossAx val="2083635528"/>
+        <c:crossAx val="2128622024"/>
         <c:crosses val="autoZero"/>
         <c:auto val="1"/>
         <c:lblAlgn val="ctr"/>
@@ -609,7 +609,7 @@
         <c:noMultiLvlLbl val="0"/>
       </c:catAx>
       <c:valAx>
-        <c:axId val="2083635528"/>
+        <c:axId val="2128622024"/>
         <c:scaling>
           <c:orientation val="minMax"/>
         </c:scaling>
@@ -620,7 +620,7 @@
         <c:majorTickMark val="out"/>
         <c:minorTickMark val="none"/>
         <c:tickLblPos val="nextTo"/>
-        <c:crossAx val="2106935720"/>
+        <c:crossAx val="2128625096"/>
         <c:crosses val="autoZero"/>
         <c:crossBetween val="between"/>
       </c:valAx>
@@ -1183,7 +1183,7 @@
           <a:p>
             <a:fld id="{DBF07D2D-D193-49EA-AA40-D0161EE95780}" type="datetimeFigureOut">
               <a:rPr lang="en-US" smtClean="0"/>
-              <a:t>1/18/16</a:t>
+              <a:t>1/22/16</a:t>
             </a:fld>
             <a:endParaRPr lang="en-US"/>
           </a:p>
@@ -10853,7 +10853,7 @@
   </p:timing>
   <p:extLst mod="1">
     <p:ext uri="{DCECCB84-F9BA-43D5-87BE-67443E8EF086}">
-      <p15:sldGuideLst xmlns:p15="http://schemas.microsoft.com/office/powerpoint/2012/main" xmlns=""/>
+      <p15:sldGuideLst xmlns="" xmlns:p15="http://schemas.microsoft.com/office/powerpoint/2012/main"/>
     </p:ext>
   </p:extLst>
 </p:sldLayout>
@@ -15986,7 +15986,7 @@
   </p:timing>
   <p:extLst mod="1">
     <p:ext uri="{DCECCB84-F9BA-43D5-87BE-67443E8EF086}">
-      <p15:sldGuideLst xmlns:p15="http://schemas.microsoft.com/office/powerpoint/2012/main" xmlns=""/>
+      <p15:sldGuideLst xmlns="" xmlns:p15="http://schemas.microsoft.com/office/powerpoint/2012/main"/>
     </p:ext>
   </p:extLst>
 </p:sldLayout>
@@ -24575,7 +24575,7 @@
   </p:timing>
   <p:extLst mod="1">
     <p:ext uri="{DCECCB84-F9BA-43D5-87BE-67443E8EF086}">
-      <p15:sldGuideLst xmlns:p15="http://schemas.microsoft.com/office/powerpoint/2012/main" xmlns=""/>
+      <p15:sldGuideLst xmlns="" xmlns:p15="http://schemas.microsoft.com/office/powerpoint/2012/main"/>
     </p:ext>
   </p:extLst>
 </p:sldLayout>
@@ -28535,7 +28535,7 @@
   </p:timing>
   <p:extLst mod="1">
     <p:ext uri="{DCECCB84-F9BA-43D5-87BE-67443E8EF086}">
-      <p15:sldGuideLst xmlns:p15="http://schemas.microsoft.com/office/powerpoint/2012/main" xmlns=""/>
+      <p15:sldGuideLst xmlns="" xmlns:p15="http://schemas.microsoft.com/office/powerpoint/2012/main"/>
     </p:ext>
   </p:extLst>
 </p:sldLayout>
@@ -32666,7 +32666,7 @@
   </p:timing>
   <p:extLst mod="1">
     <p:ext uri="{DCECCB84-F9BA-43D5-87BE-67443E8EF086}">
-      <p15:sldGuideLst xmlns:p15="http://schemas.microsoft.com/office/powerpoint/2012/main" xmlns=""/>
+      <p15:sldGuideLst xmlns="" xmlns:p15="http://schemas.microsoft.com/office/powerpoint/2012/main"/>
     </p:ext>
   </p:extLst>
 </p:sldLayout>
@@ -36666,7 +36666,7 @@
   </p:timing>
   <p:extLst mod="1">
     <p:ext uri="{DCECCB84-F9BA-43D5-87BE-67443E8EF086}">
-      <p15:sldGuideLst xmlns:p15="http://schemas.microsoft.com/office/powerpoint/2012/main" xmlns=""/>
+      <p15:sldGuideLst xmlns="" xmlns:p15="http://schemas.microsoft.com/office/powerpoint/2012/main"/>
     </p:ext>
   </p:extLst>
 </p:sldLayout>
@@ -41040,7 +41040,7 @@
   </p:txStyles>
   <p:extLst mod="1">
     <p:ext uri="{27BBF7A9-308A-43DC-89C8-2F10F3537804}">
-      <p15:sldGuideLst xmlns:p15="http://schemas.microsoft.com/office/powerpoint/2012/main" xmlns="">
+      <p15:sldGuideLst xmlns="" xmlns:p15="http://schemas.microsoft.com/office/powerpoint/2012/main">
         <p15:guide id="1" orient="horz" pos="59">
           <p15:clr>
             <a:srgbClr val="5ACBF0"/>
@@ -46764,18 +46764,7 @@
                 <a:ea typeface="Adobe Gothic Std B" panose="020B0800000000000000" pitchFamily="34" charset="-128"/>
                 <a:cs typeface="Arial"/>
               </a:rPr>
-              <a:t>71</a:t>
-            </a:r>
-            <a:r>
-              <a:rPr lang="en-US" sz="5400" dirty="0" smtClean="0">
-                <a:solidFill>
-                  <a:srgbClr val="000000"/>
-                </a:solidFill>
-                <a:latin typeface="Arial"/>
-                <a:ea typeface="Adobe Gothic Std B" panose="020B0800000000000000" pitchFamily="34" charset="-128"/>
-                <a:cs typeface="Arial"/>
-              </a:rPr>
-              <a:t>%</a:t>
+              <a:t>71%</a:t>
             </a:r>
             <a:endParaRPr lang="en-US" sz="5400" dirty="0">
               <a:solidFill>
@@ -49589,7 +49578,7 @@
         <p:spPr>
           <a:xfrm>
             <a:off x="381000" y="140807"/>
-            <a:ext cx="8280400" cy="879938"/>
+            <a:ext cx="8572500" cy="879938"/>
           </a:xfrm>
           <a:prstGeom prst="rect">
             <a:avLst/>
@@ -49655,19 +49644,16 @@
                 <a:ea typeface="Adobe Gothic Std B" panose="020B0800000000000000" pitchFamily="34" charset="-128"/>
                 <a:cs typeface="Arial"/>
               </a:rPr>
-              <a:t>28 </a:t>
+              <a:t>28 states + DC</a:t>
             </a:r>
-            <a:r>
-              <a:rPr lang="en-US" sz="3200" b="1" dirty="0">
-                <a:solidFill>
-                  <a:srgbClr val="7665A0"/>
-                </a:solidFill>
-                <a:latin typeface="Arial"/>
-                <a:ea typeface="Adobe Gothic Std B" panose="020B0800000000000000" pitchFamily="34" charset="-128"/>
-                <a:cs typeface="Arial"/>
-              </a:rPr>
-              <a:t>states</a:t>
-            </a:r>
+            <a:endParaRPr lang="en-US" sz="3200" b="1" dirty="0">
+              <a:solidFill>
+                <a:srgbClr val="7665A0"/>
+              </a:solidFill>
+              <a:latin typeface="Arial"/>
+              <a:ea typeface="Adobe Gothic Std B" panose="020B0800000000000000" pitchFamily="34" charset="-128"/>
+              <a:cs typeface="Arial"/>
+            </a:endParaRPr>
           </a:p>
           <a:p>
             <a:pPr>
@@ -49733,7 +49719,7 @@
               </a:lnSpc>
             </a:pPr>
             <a:r>
-              <a:rPr lang="en-US" sz="2000">
+              <a:rPr lang="en-US" sz="2000" dirty="0">
                 <a:solidFill>
                   <a:srgbClr val="000000"/>
                 </a:solidFill>
@@ -49744,7 +49730,7 @@
               <a:t>In </a:t>
             </a:r>
             <a:r>
-              <a:rPr lang="en-US" sz="2000" smtClean="0">
+              <a:rPr lang="en-US" sz="2000" dirty="0" smtClean="0">
                 <a:solidFill>
                   <a:srgbClr val="000000"/>
                 </a:solidFill>
@@ -49752,7 +49738,7 @@
                 <a:ea typeface="Adobe Gothic Std B" panose="020B0800000000000000" pitchFamily="34" charset="-128"/>
                 <a:cs typeface="Arial"/>
               </a:rPr>
-              <a:t>27 </a:t>
+              <a:t>28 </a:t>
             </a:r>
             <a:r>
               <a:rPr lang="en-US" sz="2000" dirty="0">
@@ -49774,21 +49760,10 @@
                 <a:ea typeface="Adobe Gothic Std B" panose="020B0800000000000000" pitchFamily="34" charset="-128"/>
                 <a:cs typeface="Arial"/>
               </a:rPr>
-              <a:t>up </a:t>
+              <a:t>up from </a:t>
             </a:r>
             <a:r>
-              <a:rPr lang="en-US" sz="2000" b="1">
-                <a:solidFill>
-                  <a:srgbClr val="000000"/>
-                </a:solidFill>
-                <a:latin typeface="Arial"/>
-                <a:ea typeface="Adobe Gothic Std B" panose="020B0800000000000000" pitchFamily="34" charset="-128"/>
-                <a:cs typeface="Arial"/>
-              </a:rPr>
-              <a:t>from </a:t>
-            </a:r>
-            <a:r>
-              <a:rPr lang="en-US" sz="2000" b="1" smtClean="0">
+              <a:rPr lang="en-US" sz="2000" b="1" dirty="0" smtClean="0">
                 <a:solidFill>
                   <a:srgbClr val="000000"/>
                 </a:solidFill>
@@ -54964,7 +54939,7 @@
   <a:extraClrSchemeLst/>
   <a:extLst>
     <a:ext uri="{05A4C25C-085E-4340-85A3-A5531E510DB2}">
-      <thm15:themeFamily xmlns:thm15="http://schemas.microsoft.com/office/thememl/2012/main" xmlns="" name="Office Theme" id="{62F939B6-93AF-4DB8-9C6B-D6C7DFDC589F}" vid="{4A3C46E8-61CC-4603-A589-7422A47A8E4A}"/>
+      <thm15:themeFamily xmlns="" xmlns:thm15="http://schemas.microsoft.com/office/thememl/2012/main" name="Office Theme" id="{62F939B6-93AF-4DB8-9C6B-D6C7DFDC589F}" vid="{4A3C46E8-61CC-4603-A589-7422A47A8E4A}"/>
     </a:ext>
   </a:extLst>
 </a:theme>
@@ -55266,7 +55241,7 @@
   <a:extraClrSchemeLst/>
   <a:extLst>
     <a:ext uri="{05A4C25C-085E-4340-85A3-A5531E510DB2}">
-      <thm15:themeFamily xmlns:thm15="http://schemas.microsoft.com/office/thememl/2012/main" xmlns="" name="SilverFox_Mentorship_Template" id="{726D2EC8-FE65-4BB6-9D87-EBBA7FA7A28A}" vid="{43A7A536-22B6-435A-A09C-B3CB1EAFEC96}"/>
+      <thm15:themeFamily xmlns="" xmlns:thm15="http://schemas.microsoft.com/office/thememl/2012/main" name="SilverFox_Mentorship_Template" id="{726D2EC8-FE65-4BB6-9D87-EBBA7FA7A28A}" vid="{43A7A536-22B6-435A-A09C-B3CB1EAFEC96}"/>
     </a:ext>
   </a:extLst>
 </a:theme>
@@ -55560,7 +55535,7 @@
   <a:extraClrSchemeLst/>
   <a:extLst>
     <a:ext uri="{05A4C25C-085E-4340-85A3-A5531E510DB2}">
-      <thm15:themeFamily xmlns:thm15="http://schemas.microsoft.com/office/thememl/2012/main" xmlns="" name="Office Theme" id="{62F939B6-93AF-4DB8-9C6B-D6C7DFDC589F}" vid="{4A3C46E8-61CC-4603-A589-7422A47A8E4A}"/>
+      <thm15:themeFamily xmlns="" xmlns:thm15="http://schemas.microsoft.com/office/thememl/2012/main" name="Office Theme" id="{62F939B6-93AF-4DB8-9C6B-D6C7DFDC589F}" vid="{4A3C46E8-61CC-4603-A589-7422A47A8E4A}"/>
     </a:ext>
   </a:extLst>
 </a:theme>
@@ -55821,7 +55796,7 @@
   <a:extraClrSchemeLst/>
   <a:extLst>
     <a:ext uri="{05A4C25C-085E-4340-85A3-A5531E510DB2}">
-      <thm15:themeFamily xmlns:thm15="http://schemas.microsoft.com/office/thememl/2012/main" xmlns="" name="Office Theme" id="{62F939B6-93AF-4DB8-9C6B-D6C7DFDC589F}" vid="{4A3C46E8-61CC-4603-A589-7422A47A8E4A}"/>
+      <thm15:themeFamily xmlns="" xmlns:thm15="http://schemas.microsoft.com/office/thememl/2012/main" name="Office Theme" id="{62F939B6-93AF-4DB8-9C6B-D6C7DFDC589F}" vid="{4A3C46E8-61CC-4603-A589-7422A47A8E4A}"/>
     </a:ext>
   </a:extLst>
 </a:theme>

</xml_diff>

<commit_message>
staging content changes (-Phil)
</commit_message>
<xml_diff>
--- a/pegasus/sites.v3/code.org/public/files/computer_science_advocacy.pptx
+++ b/pegasus/sites.v3/code.org/public/files/computer_science_advocacy.pptx
@@ -136,7 +136,7 @@
   </p:defaultTextStyle>
   <p:extLst>
     <p:ext uri="{EFAFB233-063F-42B5-8137-9DF3F51BA10A}">
-      <p15:sldGuideLst xmlns:p15="http://schemas.microsoft.com/office/powerpoint/2012/main" xmlns="">
+      <p15:sldGuideLst xmlns="" xmlns:p15="http://schemas.microsoft.com/office/powerpoint/2012/main">
         <p15:guide id="1" orient="horz" pos="331" userDrawn="1">
           <p15:clr>
             <a:srgbClr val="A4A3A4"/>
@@ -587,11 +587,11 @@
         </c:dLbls>
         <c:gapWidth val="150"/>
         <c:overlap val="100"/>
-        <c:axId val="-2123644344"/>
-        <c:axId val="-2123350216"/>
+        <c:axId val="2117800120"/>
+        <c:axId val="2117809960"/>
       </c:barChart>
       <c:catAx>
-        <c:axId val="-2123644344"/>
+        <c:axId val="2117800120"/>
         <c:scaling>
           <c:orientation val="minMax"/>
         </c:scaling>
@@ -601,7 +601,7 @@
         <c:majorTickMark val="out"/>
         <c:minorTickMark val="none"/>
         <c:tickLblPos val="nextTo"/>
-        <c:crossAx val="-2123350216"/>
+        <c:crossAx val="2117809960"/>
         <c:crosses val="autoZero"/>
         <c:auto val="1"/>
         <c:lblAlgn val="ctr"/>
@@ -609,7 +609,7 @@
         <c:noMultiLvlLbl val="0"/>
       </c:catAx>
       <c:valAx>
-        <c:axId val="-2123350216"/>
+        <c:axId val="2117809960"/>
         <c:scaling>
           <c:orientation val="minMax"/>
         </c:scaling>
@@ -620,7 +620,7 @@
         <c:majorTickMark val="out"/>
         <c:minorTickMark val="none"/>
         <c:tickLblPos val="nextTo"/>
-        <c:crossAx val="-2123644344"/>
+        <c:crossAx val="2117800120"/>
         <c:crosses val="autoZero"/>
         <c:crossBetween val="between"/>
       </c:valAx>
@@ -1183,7 +1183,7 @@
           <a:p>
             <a:fld id="{DBF07D2D-D193-49EA-AA40-D0161EE95780}" type="datetimeFigureOut">
               <a:rPr lang="en-US" smtClean="0"/>
-              <a:t>1/28/16</a:t>
+              <a:t>2/1/16</a:t>
             </a:fld>
             <a:endParaRPr lang="en-US"/>
           </a:p>
@@ -10853,7 +10853,7 @@
   </p:timing>
   <p:extLst mod="1">
     <p:ext uri="{DCECCB84-F9BA-43D5-87BE-67443E8EF086}">
-      <p15:sldGuideLst xmlns:p15="http://schemas.microsoft.com/office/powerpoint/2012/main" xmlns=""/>
+      <p15:sldGuideLst xmlns="" xmlns:p15="http://schemas.microsoft.com/office/powerpoint/2012/main"/>
     </p:ext>
   </p:extLst>
 </p:sldLayout>
@@ -15986,7 +15986,7 @@
   </p:timing>
   <p:extLst mod="1">
     <p:ext uri="{DCECCB84-F9BA-43D5-87BE-67443E8EF086}">
-      <p15:sldGuideLst xmlns:p15="http://schemas.microsoft.com/office/powerpoint/2012/main" xmlns=""/>
+      <p15:sldGuideLst xmlns="" xmlns:p15="http://schemas.microsoft.com/office/powerpoint/2012/main"/>
     </p:ext>
   </p:extLst>
 </p:sldLayout>
@@ -24575,7 +24575,7 @@
   </p:timing>
   <p:extLst mod="1">
     <p:ext uri="{DCECCB84-F9BA-43D5-87BE-67443E8EF086}">
-      <p15:sldGuideLst xmlns:p15="http://schemas.microsoft.com/office/powerpoint/2012/main" xmlns=""/>
+      <p15:sldGuideLst xmlns="" xmlns:p15="http://schemas.microsoft.com/office/powerpoint/2012/main"/>
     </p:ext>
   </p:extLst>
 </p:sldLayout>
@@ -28535,7 +28535,7 @@
   </p:timing>
   <p:extLst mod="1">
     <p:ext uri="{DCECCB84-F9BA-43D5-87BE-67443E8EF086}">
-      <p15:sldGuideLst xmlns:p15="http://schemas.microsoft.com/office/powerpoint/2012/main" xmlns=""/>
+      <p15:sldGuideLst xmlns="" xmlns:p15="http://schemas.microsoft.com/office/powerpoint/2012/main"/>
     </p:ext>
   </p:extLst>
 </p:sldLayout>
@@ -32666,7 +32666,7 @@
   </p:timing>
   <p:extLst mod="1">
     <p:ext uri="{DCECCB84-F9BA-43D5-87BE-67443E8EF086}">
-      <p15:sldGuideLst xmlns:p15="http://schemas.microsoft.com/office/powerpoint/2012/main" xmlns=""/>
+      <p15:sldGuideLst xmlns="" xmlns:p15="http://schemas.microsoft.com/office/powerpoint/2012/main"/>
     </p:ext>
   </p:extLst>
 </p:sldLayout>
@@ -36666,7 +36666,7 @@
   </p:timing>
   <p:extLst mod="1">
     <p:ext uri="{DCECCB84-F9BA-43D5-87BE-67443E8EF086}">
-      <p15:sldGuideLst xmlns:p15="http://schemas.microsoft.com/office/powerpoint/2012/main" xmlns=""/>
+      <p15:sldGuideLst xmlns="" xmlns:p15="http://schemas.microsoft.com/office/powerpoint/2012/main"/>
     </p:ext>
   </p:extLst>
 </p:sldLayout>
@@ -41040,7 +41040,7 @@
   </p:txStyles>
   <p:extLst mod="1">
     <p:ext uri="{27BBF7A9-308A-43DC-89C8-2F10F3537804}">
-      <p15:sldGuideLst xmlns:p15="http://schemas.microsoft.com/office/powerpoint/2012/main" xmlns="">
+      <p15:sldGuideLst xmlns="" xmlns:p15="http://schemas.microsoft.com/office/powerpoint/2012/main">
         <p15:guide id="1" orient="horz" pos="59">
           <p15:clr>
             <a:srgbClr val="5ACBF0"/>
@@ -45150,8 +45150,27 @@
                 <a:ea typeface="Adobe Gothic Std B" panose="020B0800000000000000" pitchFamily="34" charset="-128"/>
                 <a:cs typeface="Arial"/>
               </a:rPr>
-              <a:t>The Bureau of Labor Statistics predicts 1 million open computing jobs in the U.S. by 2022</a:t>
+              <a:t>The Bureau of Labor Statistics predicts 1 million open computing jobs in the U.S. by </a:t>
             </a:r>
+            <a:r>
+              <a:rPr lang="en-US" sz="2800" dirty="0" smtClean="0">
+                <a:solidFill>
+                  <a:srgbClr val="000000"/>
+                </a:solidFill>
+                <a:latin typeface="Arial"/>
+                <a:ea typeface="Adobe Gothic Std B" panose="020B0800000000000000" pitchFamily="34" charset="-128"/>
+                <a:cs typeface="Arial"/>
+              </a:rPr>
+              <a:t>2024</a:t>
+            </a:r>
+            <a:endParaRPr lang="en-US" sz="2800" dirty="0">
+              <a:solidFill>
+                <a:srgbClr val="000000"/>
+              </a:solidFill>
+              <a:latin typeface="Arial"/>
+              <a:ea typeface="Adobe Gothic Std B" panose="020B0800000000000000" pitchFamily="34" charset="-128"/>
+              <a:cs typeface="Arial"/>
+            </a:endParaRPr>
           </a:p>
         </p:txBody>
       </p:sp>
@@ -54938,7 +54957,7 @@
   <a:extraClrSchemeLst/>
   <a:extLst>
     <a:ext uri="{05A4C25C-085E-4340-85A3-A5531E510DB2}">
-      <thm15:themeFamily xmlns:thm15="http://schemas.microsoft.com/office/thememl/2012/main" xmlns="" name="Office Theme" id="{62F939B6-93AF-4DB8-9C6B-D6C7DFDC589F}" vid="{4A3C46E8-61CC-4603-A589-7422A47A8E4A}"/>
+      <thm15:themeFamily xmlns="" xmlns:thm15="http://schemas.microsoft.com/office/thememl/2012/main" name="Office Theme" id="{62F939B6-93AF-4DB8-9C6B-D6C7DFDC589F}" vid="{4A3C46E8-61CC-4603-A589-7422A47A8E4A}"/>
     </a:ext>
   </a:extLst>
 </a:theme>
@@ -55240,7 +55259,7 @@
   <a:extraClrSchemeLst/>
   <a:extLst>
     <a:ext uri="{05A4C25C-085E-4340-85A3-A5531E510DB2}">
-      <thm15:themeFamily xmlns:thm15="http://schemas.microsoft.com/office/thememl/2012/main" xmlns="" name="SilverFox_Mentorship_Template" id="{726D2EC8-FE65-4BB6-9D87-EBBA7FA7A28A}" vid="{43A7A536-22B6-435A-A09C-B3CB1EAFEC96}"/>
+      <thm15:themeFamily xmlns="" xmlns:thm15="http://schemas.microsoft.com/office/thememl/2012/main" name="SilverFox_Mentorship_Template" id="{726D2EC8-FE65-4BB6-9D87-EBBA7FA7A28A}" vid="{43A7A536-22B6-435A-A09C-B3CB1EAFEC96}"/>
     </a:ext>
   </a:extLst>
 </a:theme>
@@ -55534,7 +55553,7 @@
   <a:extraClrSchemeLst/>
   <a:extLst>
     <a:ext uri="{05A4C25C-085E-4340-85A3-A5531E510DB2}">
-      <thm15:themeFamily xmlns:thm15="http://schemas.microsoft.com/office/thememl/2012/main" xmlns="" name="Office Theme" id="{62F939B6-93AF-4DB8-9C6B-D6C7DFDC589F}" vid="{4A3C46E8-61CC-4603-A589-7422A47A8E4A}"/>
+      <thm15:themeFamily xmlns="" xmlns:thm15="http://schemas.microsoft.com/office/thememl/2012/main" name="Office Theme" id="{62F939B6-93AF-4DB8-9C6B-D6C7DFDC589F}" vid="{4A3C46E8-61CC-4603-A589-7422A47A8E4A}"/>
     </a:ext>
   </a:extLst>
 </a:theme>
@@ -55795,7 +55814,7 @@
   <a:extraClrSchemeLst/>
   <a:extLst>
     <a:ext uri="{05A4C25C-085E-4340-85A3-A5531E510DB2}">
-      <thm15:themeFamily xmlns:thm15="http://schemas.microsoft.com/office/thememl/2012/main" xmlns="" name="Office Theme" id="{62F939B6-93AF-4DB8-9C6B-D6C7DFDC589F}" vid="{4A3C46E8-61CC-4603-A589-7422A47A8E4A}"/>
+      <thm15:themeFamily xmlns="" xmlns:thm15="http://schemas.microsoft.com/office/thememl/2012/main" name="Office Theme" id="{62F939B6-93AF-4DB8-9C6B-D6C7DFDC589F}" vid="{4A3C46E8-61CC-4603-A589-7422A47A8E4A}"/>
     </a:ext>
   </a:extLst>
 </a:theme>

</xml_diff>

<commit_message>
staging content changes (-Brad)
</commit_message>
<xml_diff>
--- a/pegasus/sites.v3/code.org/public/files/computer_science_advocacy.pptx
+++ b/pegasus/sites.v3/code.org/public/files/computer_science_advocacy.pptx
@@ -16,7 +16,7 @@
     <p:sldId id="422" r:id="rId7"/>
     <p:sldId id="423" r:id="rId8"/>
     <p:sldId id="424" r:id="rId9"/>
-    <p:sldId id="425" r:id="rId10"/>
+    <p:sldId id="440" r:id="rId10"/>
     <p:sldId id="430" r:id="rId11"/>
     <p:sldId id="431" r:id="rId12"/>
     <p:sldId id="432" r:id="rId13"/>
@@ -136,7 +136,7 @@
   </p:defaultTextStyle>
   <p:extLst>
     <p:ext uri="{EFAFB233-063F-42B5-8137-9DF3F51BA10A}">
-      <p15:sldGuideLst xmlns="" xmlns:p15="http://schemas.microsoft.com/office/powerpoint/2012/main">
+      <p15:sldGuideLst xmlns:p15="http://schemas.microsoft.com/office/powerpoint/2012/main" xmlns="">
         <p15:guide id="1" orient="horz" pos="331" userDrawn="1">
           <p15:clr>
             <a:srgbClr val="A4A3A4"/>
@@ -448,13 +448,23 @@
   <c:chart>
     <c:autoTitleDeleted val="0"/>
     <c:plotArea>
-      <c:layout/>
+      <c:layout>
+        <c:manualLayout>
+          <c:layoutTarget val="inner"/>
+          <c:xMode val="edge"/>
+          <c:yMode val="edge"/>
+          <c:x val="0.0666804620055023"/>
+          <c:y val="0.0417000907248491"/>
+          <c:w val="0.913741224741486"/>
+          <c:h val="0.876995593075815"/>
+        </c:manualLayout>
+      </c:layout>
       <c:barChart>
         <c:barDir val="col"/>
         <c:grouping val="stacked"/>
         <c:varyColors val="0"/>
         <c:ser>
-          <c:idx val="0"/>
+          <c:idx val="1"/>
           <c:order val="0"/>
           <c:spPr>
             <a:noFill/>
@@ -463,23 +473,12 @@
             </a:ln>
           </c:spPr>
           <c:invertIfNegative val="0"/>
-          <c:dPt>
-            <c:idx val="0"/>
-            <c:invertIfNegative val="0"/>
-            <c:bubble3D val="0"/>
-            <c:spPr>
-              <a:noFill/>
-              <a:ln>
-                <a:noFill/>
-              </a:ln>
-            </c:spPr>
-          </c:dPt>
           <c:cat>
             <c:numRef>
-              <c:f>Sheet1!$A$25:$A$38</c:f>
+              <c:f>Sheet1!$A$25:$A$39</c:f>
               <c:numCache>
                 <c:formatCode>General</c:formatCode>
-                <c:ptCount val="14"/>
+                <c:ptCount val="15"/>
                 <c:pt idx="0">
                   <c:v>2000.0</c:v>
                 </c:pt>
@@ -522,15 +521,18 @@
                 <c:pt idx="13">
                   <c:v>2013.0</c:v>
                 </c:pt>
+                <c:pt idx="14">
+                  <c:v>2014.0</c:v>
+                </c:pt>
               </c:numCache>
             </c:numRef>
           </c:cat>
           <c:val>
             <c:numRef>
-              <c:f>Sheet1!$C$25:$C$38</c:f>
+              <c:f>Sheet1!$C$25:$C$39</c:f>
               <c:numCache>
                 <c:formatCode>#,##0</c:formatCode>
-                <c:ptCount val="14"/>
+                <c:ptCount val="15"/>
                 <c:pt idx="0">
                   <c:v>9268.0</c:v>
                 </c:pt>
@@ -573,6 +575,128 @@
                 <c:pt idx="13">
                   <c:v>6338.0</c:v>
                 </c:pt>
+                <c:pt idx="14">
+                  <c:v>7327.0</c:v>
+                </c:pt>
+              </c:numCache>
+            </c:numRef>
+          </c:val>
+        </c:ser>
+        <c:ser>
+          <c:idx val="2"/>
+          <c:order val="1"/>
+          <c:spPr>
+            <a:noFill/>
+            <a:ln>
+              <a:noFill/>
+            </a:ln>
+          </c:spPr>
+          <c:invertIfNegative val="0"/>
+          <c:cat>
+            <c:numRef>
+              <c:f>Sheet1!$A$25:$A$39</c:f>
+              <c:numCache>
+                <c:formatCode>General</c:formatCode>
+                <c:ptCount val="15"/>
+                <c:pt idx="0">
+                  <c:v>2000.0</c:v>
+                </c:pt>
+                <c:pt idx="1">
+                  <c:v>2001.0</c:v>
+                </c:pt>
+                <c:pt idx="2">
+                  <c:v>2002.0</c:v>
+                </c:pt>
+                <c:pt idx="3">
+                  <c:v>2003.0</c:v>
+                </c:pt>
+                <c:pt idx="4">
+                  <c:v>2004.0</c:v>
+                </c:pt>
+                <c:pt idx="5">
+                  <c:v>2005.0</c:v>
+                </c:pt>
+                <c:pt idx="6">
+                  <c:v>2006.0</c:v>
+                </c:pt>
+                <c:pt idx="7">
+                  <c:v>2007.0</c:v>
+                </c:pt>
+                <c:pt idx="8">
+                  <c:v>2008.0</c:v>
+                </c:pt>
+                <c:pt idx="9">
+                  <c:v>2009.0</c:v>
+                </c:pt>
+                <c:pt idx="10">
+                  <c:v>2010.0</c:v>
+                </c:pt>
+                <c:pt idx="11">
+                  <c:v>2011.0</c:v>
+                </c:pt>
+                <c:pt idx="12">
+                  <c:v>2012.0</c:v>
+                </c:pt>
+                <c:pt idx="13">
+                  <c:v>2013.0</c:v>
+                </c:pt>
+                <c:pt idx="14">
+                  <c:v>2014.0</c:v>
+                </c:pt>
+              </c:numCache>
+            </c:numRef>
+          </c:cat>
+          <c:val>
+            <c:numRef>
+              <c:f>Sheet1!$D$25:$D$39</c:f>
+              <c:numCache>
+                <c:formatCode>#,##0</c:formatCode>
+                <c:ptCount val="15"/>
+                <c:pt idx="0">
+                  <c:v>24548.0</c:v>
+                </c:pt>
+                <c:pt idx="1">
+                  <c:v>28269.0</c:v>
+                </c:pt>
+                <c:pt idx="2">
+                  <c:v>31474.0</c:v>
+                </c:pt>
+                <c:pt idx="3">
+                  <c:v>35665.0</c:v>
+                </c:pt>
+                <c:pt idx="4">
+                  <c:v>35975.0</c:v>
+                </c:pt>
+                <c:pt idx="5">
+                  <c:v>33535.0</c:v>
+                </c:pt>
+                <c:pt idx="6">
+                  <c:v>28690.0</c:v>
+                </c:pt>
+                <c:pt idx="7">
+                  <c:v>25825.0</c:v>
+                </c:pt>
+                <c:pt idx="8">
+                  <c:v>23644.0</c:v>
+                </c:pt>
+                <c:pt idx="9">
+                  <c:v>23547.0</c:v>
+                </c:pt>
+                <c:pt idx="10">
+                  <c:v>24113.0</c:v>
+                </c:pt>
+                <c:pt idx="11">
+                  <c:v>26584.0</c:v>
+                </c:pt>
+                <c:pt idx="12">
+                  <c:v>29172.0</c:v>
+                </c:pt>
+                <c:pt idx="13">
+                  <c:v>31837.0</c:v>
+                </c:pt>
+                <c:pt idx="14">
+                  <c:v>35642.0</c:v>
+                </c:pt>
               </c:numCache>
             </c:numRef>
           </c:val>
@@ -587,11 +711,11 @@
         </c:dLbls>
         <c:gapWidth val="150"/>
         <c:overlap val="100"/>
-        <c:axId val="2117800120"/>
-        <c:axId val="2117809960"/>
+        <c:axId val="2132474680"/>
+        <c:axId val="2132477656"/>
       </c:barChart>
       <c:catAx>
-        <c:axId val="2117800120"/>
+        <c:axId val="2132474680"/>
         <c:scaling>
           <c:orientation val="minMax"/>
         </c:scaling>
@@ -601,7 +725,7 @@
         <c:majorTickMark val="out"/>
         <c:minorTickMark val="none"/>
         <c:tickLblPos val="nextTo"/>
-        <c:crossAx val="2117809960"/>
+        <c:crossAx val="2132477656"/>
         <c:crosses val="autoZero"/>
         <c:auto val="1"/>
         <c:lblAlgn val="ctr"/>
@@ -609,9 +733,10 @@
         <c:noMultiLvlLbl val="0"/>
       </c:catAx>
       <c:valAx>
-        <c:axId val="2117809960"/>
+        <c:axId val="2132477656"/>
         <c:scaling>
           <c:orientation val="minMax"/>
+          <c:max val="50000.0"/>
         </c:scaling>
         <c:delete val="0"/>
         <c:axPos val="l"/>
@@ -620,7 +745,7 @@
         <c:majorTickMark val="out"/>
         <c:minorTickMark val="none"/>
         <c:tickLblPos val="nextTo"/>
-        <c:crossAx val="2117800120"/>
+        <c:crossAx val="2132474680"/>
         <c:crosses val="autoZero"/>
         <c:crossBetween val="between"/>
       </c:valAx>
@@ -1183,7 +1308,7 @@
           <a:p>
             <a:fld id="{DBF07D2D-D193-49EA-AA40-D0161EE95780}" type="datetimeFigureOut">
               <a:rPr lang="en-US" smtClean="0"/>
-              <a:t>2/1/16</a:t>
+              <a:t>2/18/16</a:t>
             </a:fld>
             <a:endParaRPr lang="en-US"/>
           </a:p>
@@ -1540,7 +1665,180 @@
 </p:notes>
 </file>
 
+<file path=ppt/notesSlides/notesSlide10.xml><?xml version="1.0" encoding="utf-8"?>
+<p:notes xmlns:a="http://schemas.openxmlformats.org/drawingml/2006/main" xmlns:r="http://schemas.openxmlformats.org/officeDocument/2006/relationships" xmlns:p="http://schemas.openxmlformats.org/presentationml/2006/main">
+  <p:cSld>
+    <p:spTree>
+      <p:nvGrpSpPr>
+        <p:cNvPr id="1" name=""/>
+        <p:cNvGrpSpPr/>
+        <p:nvPr/>
+      </p:nvGrpSpPr>
+      <p:grpSpPr>
+        <a:xfrm>
+          <a:off x="0" y="0"/>
+          <a:ext cx="0" cy="0"/>
+          <a:chOff x="0" y="0"/>
+          <a:chExt cx="0" cy="0"/>
+        </a:xfrm>
+      </p:grpSpPr>
+      <p:sp>
+        <p:nvSpPr>
+          <p:cNvPr id="2" name="Slide Image Placeholder 1"/>
+          <p:cNvSpPr>
+            <a:spLocks noGrp="1" noRot="1" noChangeAspect="1"/>
+          </p:cNvSpPr>
+          <p:nvPr>
+            <p:ph type="sldImg"/>
+          </p:nvPr>
+        </p:nvSpPr>
+        <p:spPr>
+          <a:xfrm>
+            <a:off x="685800" y="1143000"/>
+            <a:ext cx="5486400" cy="3086100"/>
+          </a:xfrm>
+        </p:spPr>
+      </p:sp>
+      <p:sp>
+        <p:nvSpPr>
+          <p:cNvPr id="3" name="Notes Placeholder 2"/>
+          <p:cNvSpPr>
+            <a:spLocks noGrp="1"/>
+          </p:cNvSpPr>
+          <p:nvPr>
+            <p:ph type="body" idx="1"/>
+          </p:nvPr>
+        </p:nvSpPr>
+        <p:spPr/>
+        <p:txBody>
+          <a:bodyPr/>
+          <a:lstStyle/>
+          <a:p>
+            <a:endParaRPr lang="en-US" dirty="0"/>
+          </a:p>
+        </p:txBody>
+      </p:sp>
+      <p:sp>
+        <p:nvSpPr>
+          <p:cNvPr id="4" name="Slide Number Placeholder 3"/>
+          <p:cNvSpPr>
+            <a:spLocks noGrp="1"/>
+          </p:cNvSpPr>
+          <p:nvPr>
+            <p:ph type="sldNum" sz="quarter" idx="10"/>
+          </p:nvPr>
+        </p:nvSpPr>
+        <p:spPr/>
+        <p:txBody>
+          <a:bodyPr/>
+          <a:lstStyle/>
+          <a:p>
+            <a:fld id="{D7522C71-FE57-4B9A-AC4B-B46CC73ADB87}" type="slidenum">
+              <a:rPr lang="en-US" smtClean="0"/>
+              <a:t>26</a:t>
+            </a:fld>
+            <a:endParaRPr lang="en-US"/>
+          </a:p>
+        </p:txBody>
+      </p:sp>
+    </p:spTree>
+    <p:extLst>
+      <p:ext uri="{BB962C8B-B14F-4D97-AF65-F5344CB8AC3E}">
+        <p14:creationId xmlns:p14="http://schemas.microsoft.com/office/powerpoint/2010/main" val="3827660653"/>
+      </p:ext>
+    </p:extLst>
+  </p:cSld>
+  <p:clrMapOvr>
+    <a:masterClrMapping/>
+  </p:clrMapOvr>
+</p:notes>
+</file>
+
 <file path=ppt/notesSlides/notesSlide2.xml><?xml version="1.0" encoding="utf-8"?>
+<p:notes xmlns:a="http://schemas.openxmlformats.org/drawingml/2006/main" xmlns:r="http://schemas.openxmlformats.org/officeDocument/2006/relationships" xmlns:p="http://schemas.openxmlformats.org/presentationml/2006/main">
+  <p:cSld>
+    <p:spTree>
+      <p:nvGrpSpPr>
+        <p:cNvPr id="1" name=""/>
+        <p:cNvGrpSpPr/>
+        <p:nvPr/>
+      </p:nvGrpSpPr>
+      <p:grpSpPr>
+        <a:xfrm>
+          <a:off x="0" y="0"/>
+          <a:ext cx="0" cy="0"/>
+          <a:chOff x="0" y="0"/>
+          <a:chExt cx="0" cy="0"/>
+        </a:xfrm>
+      </p:grpSpPr>
+      <p:sp>
+        <p:nvSpPr>
+          <p:cNvPr id="2" name="Slide Image Placeholder 1"/>
+          <p:cNvSpPr>
+            <a:spLocks noGrp="1" noRot="1" noChangeAspect="1"/>
+          </p:cNvSpPr>
+          <p:nvPr>
+            <p:ph type="sldImg"/>
+          </p:nvPr>
+        </p:nvSpPr>
+        <p:spPr/>
+      </p:sp>
+      <p:sp>
+        <p:nvSpPr>
+          <p:cNvPr id="3" name="Notes Placeholder 2"/>
+          <p:cNvSpPr>
+            <a:spLocks noGrp="1"/>
+          </p:cNvSpPr>
+          <p:nvPr>
+            <p:ph type="body" idx="1"/>
+          </p:nvPr>
+        </p:nvSpPr>
+        <p:spPr/>
+        <p:txBody>
+          <a:bodyPr/>
+          <a:lstStyle/>
+          <a:p>
+            <a:endParaRPr lang="en-US" dirty="0"/>
+          </a:p>
+        </p:txBody>
+      </p:sp>
+      <p:sp>
+        <p:nvSpPr>
+          <p:cNvPr id="4" name="Slide Number Placeholder 3"/>
+          <p:cNvSpPr>
+            <a:spLocks noGrp="1"/>
+          </p:cNvSpPr>
+          <p:nvPr>
+            <p:ph type="sldNum" sz="quarter" idx="10"/>
+          </p:nvPr>
+        </p:nvSpPr>
+        <p:spPr/>
+        <p:txBody>
+          <a:bodyPr/>
+          <a:lstStyle/>
+          <a:p>
+            <a:fld id="{D7522C71-FE57-4B9A-AC4B-B46CC73ADB87}" type="slidenum">
+              <a:rPr lang="en-US" smtClean="0"/>
+              <a:t>7</a:t>
+            </a:fld>
+            <a:endParaRPr lang="en-US"/>
+          </a:p>
+        </p:txBody>
+      </p:sp>
+    </p:spTree>
+    <p:extLst>
+      <p:ext uri="{BB962C8B-B14F-4D97-AF65-F5344CB8AC3E}">
+        <p14:creationId xmlns:p14="http://schemas.microsoft.com/office/powerpoint/2010/main" val="886174451"/>
+      </p:ext>
+    </p:extLst>
+  </p:cSld>
+  <p:clrMapOvr>
+    <a:masterClrMapping/>
+  </p:clrMapOvr>
+</p:notes>
+</file>
+
+<file path=ppt/notesSlides/notesSlide3.xml><?xml version="1.0" encoding="utf-8"?>
 <p:notes xmlns:a="http://schemas.openxmlformats.org/drawingml/2006/main" xmlns:r="http://schemas.openxmlformats.org/officeDocument/2006/relationships" xmlns:p="http://schemas.openxmlformats.org/presentationml/2006/main">
   <p:cSld>
     <p:spTree>
@@ -1656,7 +1954,7 @@
 </p:notes>
 </file>
 
-<file path=ppt/notesSlides/notesSlide3.xml><?xml version="1.0" encoding="utf-8"?>
+<file path=ppt/notesSlides/notesSlide4.xml><?xml version="1.0" encoding="utf-8"?>
 <p:notes xmlns:a="http://schemas.openxmlformats.org/drawingml/2006/main" xmlns:r="http://schemas.openxmlformats.org/officeDocument/2006/relationships" xmlns:p="http://schemas.openxmlformats.org/presentationml/2006/main">
   <p:cSld>
     <p:spTree>
@@ -1764,7 +2062,7 @@
 </p:notes>
 </file>
 
-<file path=ppt/notesSlides/notesSlide4.xml><?xml version="1.0" encoding="utf-8"?>
+<file path=ppt/notesSlides/notesSlide5.xml><?xml version="1.0" encoding="utf-8"?>
 <p:notes xmlns:a="http://schemas.openxmlformats.org/drawingml/2006/main" xmlns:r="http://schemas.openxmlformats.org/officeDocument/2006/relationships" xmlns:p="http://schemas.openxmlformats.org/presentationml/2006/main">
   <p:cSld>
     <p:spTree>
@@ -1853,7 +2151,7 @@
 </p:notes>
 </file>
 
-<file path=ppt/notesSlides/notesSlide5.xml><?xml version="1.0" encoding="utf-8"?>
+<file path=ppt/notesSlides/notesSlide6.xml><?xml version="1.0" encoding="utf-8"?>
 <p:notes xmlns:a="http://schemas.openxmlformats.org/drawingml/2006/main" xmlns:r="http://schemas.openxmlformats.org/officeDocument/2006/relationships" xmlns:p="http://schemas.openxmlformats.org/presentationml/2006/main">
   <p:cSld>
     <p:spTree>
@@ -1942,7 +2240,7 @@
 </p:notes>
 </file>
 
-<file path=ppt/notesSlides/notesSlide6.xml><?xml version="1.0" encoding="utf-8"?>
+<file path=ppt/notesSlides/notesSlide7.xml><?xml version="1.0" encoding="utf-8"?>
 <p:notes xmlns:a="http://schemas.openxmlformats.org/drawingml/2006/main" xmlns:r="http://schemas.openxmlformats.org/officeDocument/2006/relationships" xmlns:p="http://schemas.openxmlformats.org/presentationml/2006/main">
   <p:cSld>
     <p:spTree>
@@ -2031,7 +2329,7 @@
 </p:notes>
 </file>
 
-<file path=ppt/notesSlides/notesSlide7.xml><?xml version="1.0" encoding="utf-8"?>
+<file path=ppt/notesSlides/notesSlide8.xml><?xml version="1.0" encoding="utf-8"?>
 <p:notes xmlns:a="http://schemas.openxmlformats.org/drawingml/2006/main" xmlns:r="http://schemas.openxmlformats.org/officeDocument/2006/relationships" xmlns:p="http://schemas.openxmlformats.org/presentationml/2006/main">
   <p:cSld>
     <p:spTree>
@@ -2120,7 +2418,7 @@
 </p:notes>
 </file>
 
-<file path=ppt/notesSlides/notesSlide8.xml><?xml version="1.0" encoding="utf-8"?>
+<file path=ppt/notesSlides/notesSlide9.xml><?xml version="1.0" encoding="utf-8"?>
 <p:notes xmlns:a="http://schemas.openxmlformats.org/drawingml/2006/main" xmlns:r="http://schemas.openxmlformats.org/officeDocument/2006/relationships" xmlns:p="http://schemas.openxmlformats.org/presentationml/2006/main">
   <p:cSld>
     <p:spTree>
@@ -2204,95 +2502,6 @@
     <p:extLst>
       <p:ext uri="{BB962C8B-B14F-4D97-AF65-F5344CB8AC3E}">
         <p14:creationId xmlns:p14="http://schemas.microsoft.com/office/powerpoint/2010/main" val="1363951536"/>
-      </p:ext>
-    </p:extLst>
-  </p:cSld>
-  <p:clrMapOvr>
-    <a:masterClrMapping/>
-  </p:clrMapOvr>
-</p:notes>
-</file>
-
-<file path=ppt/notesSlides/notesSlide9.xml><?xml version="1.0" encoding="utf-8"?>
-<p:notes xmlns:a="http://schemas.openxmlformats.org/drawingml/2006/main" xmlns:r="http://schemas.openxmlformats.org/officeDocument/2006/relationships" xmlns:p="http://schemas.openxmlformats.org/presentationml/2006/main">
-  <p:cSld>
-    <p:spTree>
-      <p:nvGrpSpPr>
-        <p:cNvPr id="1" name=""/>
-        <p:cNvGrpSpPr/>
-        <p:nvPr/>
-      </p:nvGrpSpPr>
-      <p:grpSpPr>
-        <a:xfrm>
-          <a:off x="0" y="0"/>
-          <a:ext cx="0" cy="0"/>
-          <a:chOff x="0" y="0"/>
-          <a:chExt cx="0" cy="0"/>
-        </a:xfrm>
-      </p:grpSpPr>
-      <p:sp>
-        <p:nvSpPr>
-          <p:cNvPr id="2" name="Slide Image Placeholder 1"/>
-          <p:cNvSpPr>
-            <a:spLocks noGrp="1" noRot="1" noChangeAspect="1"/>
-          </p:cNvSpPr>
-          <p:nvPr>
-            <p:ph type="sldImg"/>
-          </p:nvPr>
-        </p:nvSpPr>
-        <p:spPr>
-          <a:xfrm>
-            <a:off x="685800" y="1143000"/>
-            <a:ext cx="5486400" cy="3086100"/>
-          </a:xfrm>
-        </p:spPr>
-      </p:sp>
-      <p:sp>
-        <p:nvSpPr>
-          <p:cNvPr id="3" name="Notes Placeholder 2"/>
-          <p:cNvSpPr>
-            <a:spLocks noGrp="1"/>
-          </p:cNvSpPr>
-          <p:nvPr>
-            <p:ph type="body" idx="1"/>
-          </p:nvPr>
-        </p:nvSpPr>
-        <p:spPr/>
-        <p:txBody>
-          <a:bodyPr/>
-          <a:lstStyle/>
-          <a:p>
-            <a:endParaRPr lang="en-US" dirty="0"/>
-          </a:p>
-        </p:txBody>
-      </p:sp>
-      <p:sp>
-        <p:nvSpPr>
-          <p:cNvPr id="4" name="Slide Number Placeholder 3"/>
-          <p:cNvSpPr>
-            <a:spLocks noGrp="1"/>
-          </p:cNvSpPr>
-          <p:nvPr>
-            <p:ph type="sldNum" sz="quarter" idx="10"/>
-          </p:nvPr>
-        </p:nvSpPr>
-        <p:spPr/>
-        <p:txBody>
-          <a:bodyPr/>
-          <a:lstStyle/>
-          <a:p>
-            <a:fld id="{D7522C71-FE57-4B9A-AC4B-B46CC73ADB87}" type="slidenum">
-              <a:rPr lang="en-US" smtClean="0"/>
-              <a:t>26</a:t>
-            </a:fld>
-            <a:endParaRPr lang="en-US"/>
-          </a:p>
-        </p:txBody>
-      </p:sp>
-    </p:spTree>
-    <p:extLst>
-      <p:ext uri="{BB962C8B-B14F-4D97-AF65-F5344CB8AC3E}">
-        <p14:creationId xmlns:p14="http://schemas.microsoft.com/office/powerpoint/2010/main" val="3827660653"/>
       </p:ext>
     </p:extLst>
   </p:cSld>
@@ -10853,7 +11062,7 @@
   </p:timing>
   <p:extLst mod="1">
     <p:ext uri="{DCECCB84-F9BA-43D5-87BE-67443E8EF086}">
-      <p15:sldGuideLst xmlns="" xmlns:p15="http://schemas.microsoft.com/office/powerpoint/2012/main"/>
+      <p15:sldGuideLst xmlns:p15="http://schemas.microsoft.com/office/powerpoint/2012/main" xmlns=""/>
     </p:ext>
   </p:extLst>
 </p:sldLayout>
@@ -15986,7 +16195,7 @@
   </p:timing>
   <p:extLst mod="1">
     <p:ext uri="{DCECCB84-F9BA-43D5-87BE-67443E8EF086}">
-      <p15:sldGuideLst xmlns="" xmlns:p15="http://schemas.microsoft.com/office/powerpoint/2012/main"/>
+      <p15:sldGuideLst xmlns:p15="http://schemas.microsoft.com/office/powerpoint/2012/main" xmlns=""/>
     </p:ext>
   </p:extLst>
 </p:sldLayout>
@@ -24575,7 +24784,7 @@
   </p:timing>
   <p:extLst mod="1">
     <p:ext uri="{DCECCB84-F9BA-43D5-87BE-67443E8EF086}">
-      <p15:sldGuideLst xmlns="" xmlns:p15="http://schemas.microsoft.com/office/powerpoint/2012/main"/>
+      <p15:sldGuideLst xmlns:p15="http://schemas.microsoft.com/office/powerpoint/2012/main" xmlns=""/>
     </p:ext>
   </p:extLst>
 </p:sldLayout>
@@ -28535,7 +28744,7 @@
   </p:timing>
   <p:extLst mod="1">
     <p:ext uri="{DCECCB84-F9BA-43D5-87BE-67443E8EF086}">
-      <p15:sldGuideLst xmlns="" xmlns:p15="http://schemas.microsoft.com/office/powerpoint/2012/main"/>
+      <p15:sldGuideLst xmlns:p15="http://schemas.microsoft.com/office/powerpoint/2012/main" xmlns=""/>
     </p:ext>
   </p:extLst>
 </p:sldLayout>
@@ -32666,7 +32875,7 @@
   </p:timing>
   <p:extLst mod="1">
     <p:ext uri="{DCECCB84-F9BA-43D5-87BE-67443E8EF086}">
-      <p15:sldGuideLst xmlns="" xmlns:p15="http://schemas.microsoft.com/office/powerpoint/2012/main"/>
+      <p15:sldGuideLst xmlns:p15="http://schemas.microsoft.com/office/powerpoint/2012/main" xmlns=""/>
     </p:ext>
   </p:extLst>
 </p:sldLayout>
@@ -36666,7 +36875,7 @@
   </p:timing>
   <p:extLst mod="1">
     <p:ext uri="{DCECCB84-F9BA-43D5-87BE-67443E8EF086}">
-      <p15:sldGuideLst xmlns="" xmlns:p15="http://schemas.microsoft.com/office/powerpoint/2012/main"/>
+      <p15:sldGuideLst xmlns:p15="http://schemas.microsoft.com/office/powerpoint/2012/main" xmlns=""/>
     </p:ext>
   </p:extLst>
 </p:sldLayout>
@@ -41040,7 +41249,7 @@
   </p:txStyles>
   <p:extLst mod="1">
     <p:ext uri="{27BBF7A9-308A-43DC-89C8-2F10F3537804}">
-      <p15:sldGuideLst xmlns="" xmlns:p15="http://schemas.microsoft.com/office/powerpoint/2012/main">
+      <p15:sldGuideLst xmlns:p15="http://schemas.microsoft.com/office/powerpoint/2012/main" xmlns="">
         <p15:guide id="1" orient="horz" pos="59">
           <p15:clr>
             <a:srgbClr val="5ACBF0"/>
@@ -50891,25 +51100,25 @@
       </p:grpSpPr>
       <p:graphicFrame>
         <p:nvGraphicFramePr>
-          <p:cNvPr id="65" name="Chart 64"/>
+          <p:cNvPr id="61" name="Chart 60"/>
           <p:cNvGraphicFramePr>
             <a:graphicFrameLocks/>
           </p:cNvGraphicFramePr>
           <p:nvPr>
             <p:extLst>
               <p:ext uri="{D42A27DB-BD31-4B8C-83A1-F6EECF244321}">
-                <p14:modId xmlns:p14="http://schemas.microsoft.com/office/powerpoint/2010/main" val="1746741225"/>
+                <p14:modId xmlns:p14="http://schemas.microsoft.com/office/powerpoint/2010/main" val="3022979203"/>
               </p:ext>
             </p:extLst>
           </p:nvPr>
         </p:nvGraphicFramePr>
         <p:xfrm>
-          <a:off x="42333" y="1071033"/>
-          <a:ext cx="8372476" cy="3801532"/>
+          <a:off x="0" y="990600"/>
+          <a:ext cx="8432800" cy="3959224"/>
         </p:xfrm>
         <a:graphic>
           <a:graphicData uri="http://schemas.openxmlformats.org/drawingml/2006/chart">
-            <c:chart xmlns:c="http://schemas.openxmlformats.org/drawingml/2006/chart" xmlns:r="http://schemas.openxmlformats.org/officeDocument/2006/relationships" r:id="rId2"/>
+            <c:chart xmlns:c="http://schemas.openxmlformats.org/drawingml/2006/chart" xmlns:r="http://schemas.openxmlformats.org/officeDocument/2006/relationships" r:id="rId3"/>
           </a:graphicData>
         </a:graphic>
       </p:graphicFrame>
@@ -51031,14 +51240,14 @@
         </p:nvSpPr>
         <p:spPr>
           <a:xfrm>
-            <a:off x="725398" y="2679700"/>
-            <a:ext cx="319574" cy="1363131"/>
+            <a:off x="711200" y="2279650"/>
+            <a:ext cx="212726" cy="1704975"/>
           </a:xfrm>
           <a:prstGeom prst="rect">
             <a:avLst/>
           </a:prstGeom>
           <a:solidFill>
-            <a:srgbClr val="00AEBC"/>
+            <a:srgbClr val="00ADBC"/>
           </a:solidFill>
           <a:ln>
             <a:noFill/>
@@ -51083,14 +51292,14 @@
         </p:nvSpPr>
         <p:spPr>
           <a:xfrm>
-            <a:off x="1275053" y="2408767"/>
-            <a:ext cx="319574" cy="1562099"/>
+            <a:off x="1230603" y="1935691"/>
+            <a:ext cx="207672" cy="1966383"/>
           </a:xfrm>
           <a:prstGeom prst="rect">
             <a:avLst/>
           </a:prstGeom>
           <a:solidFill>
-            <a:srgbClr val="00AEBC"/>
+            <a:srgbClr val="00ADBC"/>
           </a:solidFill>
           <a:ln>
             <a:noFill/>
@@ -51135,14 +51344,14 @@
         </p:nvSpPr>
         <p:spPr>
           <a:xfrm>
-            <a:off x="1822139" y="2159000"/>
-            <a:ext cx="319574" cy="1756833"/>
+            <a:off x="1739589" y="1635125"/>
+            <a:ext cx="213036" cy="2187575"/>
           </a:xfrm>
           <a:prstGeom prst="rect">
             <a:avLst/>
           </a:prstGeom>
           <a:solidFill>
-            <a:srgbClr val="00AEBC"/>
+            <a:srgbClr val="00ADBC"/>
           </a:solidFill>
           <a:ln>
             <a:noFill/>
@@ -51187,14 +51396,14 @@
         </p:nvSpPr>
         <p:spPr>
           <a:xfrm>
-            <a:off x="2367536" y="1866901"/>
-            <a:ext cx="319574" cy="1972732"/>
+            <a:off x="2259586" y="1257301"/>
+            <a:ext cx="207389" cy="2479674"/>
           </a:xfrm>
           <a:prstGeom prst="rect">
             <a:avLst/>
           </a:prstGeom>
           <a:solidFill>
-            <a:srgbClr val="00AEBC"/>
+            <a:srgbClr val="00ADBC"/>
           </a:solidFill>
           <a:ln>
             <a:noFill/>
@@ -51239,14 +51448,14 @@
         </p:nvSpPr>
         <p:spPr>
           <a:xfrm>
-            <a:off x="2911012" y="1917701"/>
-            <a:ext cx="319574" cy="1993900"/>
+            <a:off x="2771312" y="1320801"/>
+            <a:ext cx="210013" cy="2498724"/>
           </a:xfrm>
           <a:prstGeom prst="rect">
             <a:avLst/>
           </a:prstGeom>
           <a:solidFill>
-            <a:srgbClr val="00AEBC"/>
+            <a:srgbClr val="00ADBC"/>
           </a:solidFill>
           <a:ln>
             <a:noFill/>
@@ -51291,14 +51500,14 @@
         </p:nvSpPr>
         <p:spPr>
           <a:xfrm>
-            <a:off x="3457036" y="2184400"/>
-            <a:ext cx="319574" cy="1858433"/>
+            <a:off x="3285586" y="1654175"/>
+            <a:ext cx="206914" cy="2324100"/>
           </a:xfrm>
           <a:prstGeom prst="rect">
             <a:avLst/>
           </a:prstGeom>
           <a:solidFill>
-            <a:srgbClr val="00AEBC"/>
+            <a:srgbClr val="00ADBC"/>
           </a:solidFill>
           <a:ln>
             <a:noFill/>
@@ -51343,14 +51552,14 @@
         </p:nvSpPr>
         <p:spPr>
           <a:xfrm>
-            <a:off x="4003060" y="2573867"/>
-            <a:ext cx="319574" cy="1591733"/>
+            <a:off x="3796685" y="2148417"/>
+            <a:ext cx="210165" cy="1991783"/>
           </a:xfrm>
           <a:prstGeom prst="rect">
             <a:avLst/>
           </a:prstGeom>
           <a:solidFill>
-            <a:srgbClr val="00AEBC"/>
+            <a:srgbClr val="00ADBC"/>
           </a:solidFill>
           <a:ln>
             <a:noFill/>
@@ -51395,14 +51604,14 @@
         </p:nvSpPr>
         <p:spPr>
           <a:xfrm>
-            <a:off x="4551200" y="2806700"/>
-            <a:ext cx="319574" cy="1435099"/>
+            <a:off x="4313076" y="2444750"/>
+            <a:ext cx="204950" cy="1797050"/>
           </a:xfrm>
           <a:prstGeom prst="rect">
             <a:avLst/>
           </a:prstGeom>
           <a:solidFill>
-            <a:srgbClr val="00AEBC"/>
+            <a:srgbClr val="00ADBC"/>
           </a:solidFill>
           <a:ln>
             <a:noFill/>
@@ -51447,14 +51656,14 @@
         </p:nvSpPr>
         <p:spPr>
           <a:xfrm>
-            <a:off x="5098285" y="2976033"/>
-            <a:ext cx="319574" cy="1312283"/>
+            <a:off x="4825235" y="2655358"/>
+            <a:ext cx="207140" cy="1643592"/>
           </a:xfrm>
           <a:prstGeom prst="rect">
             <a:avLst/>
           </a:prstGeom>
           <a:solidFill>
-            <a:srgbClr val="00AEBC"/>
+            <a:srgbClr val="00ADBC"/>
           </a:solidFill>
           <a:ln>
             <a:noFill/>
@@ -51499,14 +51708,14 @@
         </p:nvSpPr>
         <p:spPr>
           <a:xfrm>
-            <a:off x="5642196" y="2980267"/>
-            <a:ext cx="319574" cy="1308099"/>
+            <a:off x="5340571" y="2662767"/>
+            <a:ext cx="209329" cy="1633008"/>
           </a:xfrm>
           <a:prstGeom prst="rect">
             <a:avLst/>
           </a:prstGeom>
           <a:solidFill>
-            <a:srgbClr val="00AEBC"/>
+            <a:srgbClr val="00ADBC"/>
           </a:solidFill>
           <a:ln>
             <a:noFill/>
@@ -51551,14 +51760,14 @@
         </p:nvSpPr>
         <p:spPr>
           <a:xfrm>
-            <a:off x="6186730" y="2937933"/>
-            <a:ext cx="319574" cy="1337733"/>
+            <a:off x="5850180" y="2604558"/>
+            <a:ext cx="210895" cy="1678517"/>
           </a:xfrm>
           <a:prstGeom prst="rect">
             <a:avLst/>
           </a:prstGeom>
           <a:solidFill>
-            <a:srgbClr val="00AEBC"/>
+            <a:srgbClr val="00ADBC"/>
           </a:solidFill>
           <a:ln>
             <a:noFill/>
@@ -51603,14 +51812,14 @@
         </p:nvSpPr>
         <p:spPr>
           <a:xfrm>
-            <a:off x="6734870" y="2789768"/>
-            <a:ext cx="319574" cy="1481666"/>
+            <a:off x="6363395" y="2421467"/>
+            <a:ext cx="215205" cy="1848907"/>
           </a:xfrm>
           <a:prstGeom prst="rect">
             <a:avLst/>
           </a:prstGeom>
           <a:solidFill>
-            <a:srgbClr val="00AEBC"/>
+            <a:srgbClr val="00ADBC"/>
           </a:solidFill>
           <a:ln>
             <a:noFill/>
@@ -51655,14 +51864,14 @@
         </p:nvSpPr>
         <p:spPr>
           <a:xfrm>
-            <a:off x="6734414" y="4267200"/>
-            <a:ext cx="319574" cy="284825"/>
+            <a:off x="6366114" y="4267201"/>
+            <a:ext cx="209311" cy="357850"/>
           </a:xfrm>
           <a:prstGeom prst="rect">
             <a:avLst/>
           </a:prstGeom>
           <a:solidFill>
-            <a:srgbClr val="7030A0"/>
+            <a:srgbClr val="7665A0"/>
           </a:solidFill>
           <a:ln>
             <a:noFill/>
@@ -51707,14 +51916,14 @@
         </p:nvSpPr>
         <p:spPr>
           <a:xfrm>
-            <a:off x="6186730" y="4275667"/>
-            <a:ext cx="319574" cy="267757"/>
+            <a:off x="5850180" y="4283075"/>
+            <a:ext cx="207720" cy="342899"/>
           </a:xfrm>
           <a:prstGeom prst="rect">
             <a:avLst/>
           </a:prstGeom>
           <a:solidFill>
-            <a:srgbClr val="7030A0"/>
+            <a:srgbClr val="7665A0"/>
           </a:solidFill>
           <a:ln>
             <a:noFill/>
@@ -51759,14 +51968,14 @@
         </p:nvSpPr>
         <p:spPr>
           <a:xfrm>
-            <a:off x="7283012" y="2616200"/>
-            <a:ext cx="319574" cy="1604433"/>
+            <a:off x="6876612" y="2193925"/>
+            <a:ext cx="213163" cy="2032000"/>
           </a:xfrm>
           <a:prstGeom prst="rect">
             <a:avLst/>
           </a:prstGeom>
           <a:solidFill>
-            <a:srgbClr val="00AEBC"/>
+            <a:srgbClr val="00ADBC"/>
           </a:solidFill>
           <a:ln>
             <a:noFill/>
@@ -51811,14 +52020,14 @@
         </p:nvSpPr>
         <p:spPr>
           <a:xfrm>
-            <a:off x="7283012" y="4220633"/>
-            <a:ext cx="319574" cy="331389"/>
+            <a:off x="6879787" y="4222750"/>
+            <a:ext cx="206813" cy="402297"/>
           </a:xfrm>
           <a:prstGeom prst="rect">
             <a:avLst/>
           </a:prstGeom>
           <a:solidFill>
-            <a:srgbClr val="7030A0"/>
+            <a:srgbClr val="7665A0"/>
           </a:solidFill>
           <a:ln>
             <a:noFill/>
@@ -51863,14 +52072,14 @@
         </p:nvSpPr>
         <p:spPr>
           <a:xfrm>
-            <a:off x="5642196" y="4288367"/>
-            <a:ext cx="319574" cy="255058"/>
+            <a:off x="5337396" y="4295775"/>
+            <a:ext cx="209329" cy="330200"/>
           </a:xfrm>
           <a:prstGeom prst="rect">
             <a:avLst/>
           </a:prstGeom>
           <a:solidFill>
-            <a:srgbClr val="7030A0"/>
+            <a:srgbClr val="7665A0"/>
           </a:solidFill>
           <a:ln>
             <a:noFill/>
@@ -51915,14 +52124,14 @@
         </p:nvSpPr>
         <p:spPr>
           <a:xfrm>
-            <a:off x="5098285" y="4288367"/>
-            <a:ext cx="319574" cy="255057"/>
+            <a:off x="4825235" y="4295775"/>
+            <a:ext cx="210315" cy="330199"/>
           </a:xfrm>
           <a:prstGeom prst="rect">
             <a:avLst/>
           </a:prstGeom>
           <a:solidFill>
-            <a:srgbClr val="7030A0"/>
+            <a:srgbClr val="7665A0"/>
           </a:solidFill>
           <a:ln>
             <a:noFill/>
@@ -51967,14 +52176,14 @@
         </p:nvSpPr>
         <p:spPr>
           <a:xfrm>
-            <a:off x="4551200" y="4237567"/>
-            <a:ext cx="319574" cy="311283"/>
+            <a:off x="4309900" y="4238625"/>
+            <a:ext cx="208125" cy="392775"/>
           </a:xfrm>
           <a:prstGeom prst="rect">
             <a:avLst/>
           </a:prstGeom>
           <a:solidFill>
-            <a:srgbClr val="7030A0"/>
+            <a:srgbClr val="7665A0"/>
           </a:solidFill>
           <a:ln>
             <a:noFill/>
@@ -52019,14 +52228,14 @@
         </p:nvSpPr>
         <p:spPr>
           <a:xfrm>
-            <a:off x="3999885" y="4161367"/>
-            <a:ext cx="319574" cy="384306"/>
+            <a:off x="3796685" y="4137025"/>
+            <a:ext cx="206990" cy="488950"/>
           </a:xfrm>
           <a:prstGeom prst="rect">
             <a:avLst/>
           </a:prstGeom>
           <a:solidFill>
-            <a:srgbClr val="7030A0"/>
+            <a:srgbClr val="7665A0"/>
           </a:solidFill>
           <a:ln>
             <a:noFill/>
@@ -52071,14 +52280,14 @@
         </p:nvSpPr>
         <p:spPr>
           <a:xfrm>
-            <a:off x="3457036" y="4042833"/>
-            <a:ext cx="319574" cy="502839"/>
+            <a:off x="3285586" y="3981451"/>
+            <a:ext cx="203739" cy="646772"/>
           </a:xfrm>
           <a:prstGeom prst="rect">
             <a:avLst/>
           </a:prstGeom>
           <a:solidFill>
-            <a:srgbClr val="7030A0"/>
+            <a:srgbClr val="7665A0"/>
           </a:solidFill>
           <a:ln>
             <a:noFill/>
@@ -52123,14 +52332,14 @@
         </p:nvSpPr>
         <p:spPr>
           <a:xfrm>
-            <a:off x="2911012" y="3911601"/>
-            <a:ext cx="319574" cy="634998"/>
+            <a:off x="2771312" y="3822700"/>
+            <a:ext cx="206838" cy="806449"/>
           </a:xfrm>
           <a:prstGeom prst="rect">
             <a:avLst/>
           </a:prstGeom>
           <a:solidFill>
-            <a:srgbClr val="7030A0"/>
+            <a:srgbClr val="7665A0"/>
           </a:solidFill>
           <a:ln>
             <a:noFill/>
@@ -52175,14 +52384,14 @@
         </p:nvSpPr>
         <p:spPr>
           <a:xfrm>
-            <a:off x="2367536" y="3835400"/>
-            <a:ext cx="319574" cy="716622"/>
+            <a:off x="2256411" y="3736975"/>
+            <a:ext cx="207389" cy="895350"/>
           </a:xfrm>
           <a:prstGeom prst="rect">
             <a:avLst/>
           </a:prstGeom>
           <a:solidFill>
-            <a:srgbClr val="7030A0"/>
+            <a:srgbClr val="7665A0"/>
           </a:solidFill>
           <a:ln>
             <a:noFill/>
@@ -52227,14 +52436,14 @@
         </p:nvSpPr>
         <p:spPr>
           <a:xfrm>
-            <a:off x="1822139" y="3911600"/>
-            <a:ext cx="319574" cy="637247"/>
+            <a:off x="1739589" y="3819525"/>
+            <a:ext cx="209861" cy="808697"/>
           </a:xfrm>
           <a:prstGeom prst="rect">
             <a:avLst/>
           </a:prstGeom>
           <a:solidFill>
-            <a:srgbClr val="7030A0"/>
+            <a:srgbClr val="7665A0"/>
           </a:solidFill>
           <a:ln>
             <a:noFill/>
@@ -52279,14 +52488,14 @@
         </p:nvSpPr>
         <p:spPr>
           <a:xfrm>
-            <a:off x="1275053" y="3970868"/>
-            <a:ext cx="319574" cy="581158"/>
+            <a:off x="1227428" y="3901017"/>
+            <a:ext cx="210847" cy="724957"/>
           </a:xfrm>
           <a:prstGeom prst="rect">
             <a:avLst/>
           </a:prstGeom>
           <a:solidFill>
-            <a:srgbClr val="7030A0"/>
+            <a:srgbClr val="7665A0"/>
           </a:solidFill>
           <a:ln>
             <a:noFill/>
@@ -52331,14 +52540,14 @@
         </p:nvSpPr>
         <p:spPr>
           <a:xfrm>
-            <a:off x="724342" y="4038600"/>
-            <a:ext cx="319574" cy="512063"/>
+            <a:off x="711200" y="3981450"/>
+            <a:ext cx="212725" cy="658113"/>
           </a:xfrm>
           <a:prstGeom prst="rect">
             <a:avLst/>
           </a:prstGeom>
           <a:solidFill>
-            <a:srgbClr val="7030A0"/>
+            <a:srgbClr val="7665A0"/>
           </a:solidFill>
           <a:ln>
             <a:noFill/>
@@ -52733,7 +52942,7 @@
               </a:pathLst>
             </a:custGeom>
             <a:solidFill>
-              <a:srgbClr val="7030A0"/>
+              <a:srgbClr val="7665A0"/>
             </a:solidFill>
             <a:ln>
               <a:noFill/>
@@ -53113,7 +53322,7 @@
               </a:pathLst>
             </a:custGeom>
             <a:solidFill>
-              <a:srgbClr val="00CEDE"/>
+              <a:srgbClr val="00ADBC"/>
             </a:solidFill>
             <a:extLst/>
           </p:spPr>
@@ -53179,14 +53388,14 @@
         </p:nvSpPr>
         <p:spPr>
           <a:xfrm>
-            <a:off x="7821704" y="2438401"/>
-            <a:ext cx="319574" cy="1765300"/>
+            <a:off x="7393079" y="1974850"/>
+            <a:ext cx="207871" cy="2216149"/>
           </a:xfrm>
           <a:prstGeom prst="rect">
             <a:avLst/>
           </a:prstGeom>
           <a:solidFill>
-            <a:srgbClr val="00AEBC"/>
+            <a:srgbClr val="00ADBC"/>
           </a:solidFill>
           <a:ln>
             <a:noFill/>
@@ -53231,14 +53440,14 @@
         </p:nvSpPr>
         <p:spPr>
           <a:xfrm>
-            <a:off x="7821704" y="4195234"/>
-            <a:ext cx="319574" cy="350440"/>
+            <a:off x="7393079" y="4187825"/>
+            <a:ext cx="207871" cy="440399"/>
           </a:xfrm>
           <a:prstGeom prst="rect">
             <a:avLst/>
           </a:prstGeom>
           <a:solidFill>
-            <a:srgbClr val="7030A0"/>
+            <a:srgbClr val="7665A0"/>
           </a:solidFill>
           <a:ln>
             <a:noFill/>
@@ -53275,10 +53484,114 @@
           </a:p>
         </p:txBody>
       </p:sp>
+      <p:sp>
+        <p:nvSpPr>
+          <p:cNvPr id="62" name="Rectangle 61"/>
+          <p:cNvSpPr/>
+          <p:nvPr/>
+        </p:nvSpPr>
+        <p:spPr>
+          <a:xfrm>
+            <a:off x="7907429" y="1641476"/>
+            <a:ext cx="204696" cy="2479674"/>
+          </a:xfrm>
+          <a:prstGeom prst="rect">
+            <a:avLst/>
+          </a:prstGeom>
+          <a:solidFill>
+            <a:srgbClr val="00ADBC"/>
+          </a:solidFill>
+          <a:ln>
+            <a:noFill/>
+          </a:ln>
+        </p:spPr>
+        <p:style>
+          <a:lnRef idx="2">
+            <a:schemeClr val="accent1">
+              <a:shade val="50000"/>
+            </a:schemeClr>
+          </a:lnRef>
+          <a:fillRef idx="1">
+            <a:schemeClr val="accent1"/>
+          </a:fillRef>
+          <a:effectRef idx="0">
+            <a:schemeClr val="accent1"/>
+          </a:effectRef>
+          <a:fontRef idx="minor">
+            <a:schemeClr val="lt1"/>
+          </a:fontRef>
+        </p:style>
+        <p:txBody>
+          <a:bodyPr lIns="75282" tIns="37640" rIns="75282" bIns="37640" rtlCol="0" anchor="ctr"/>
+          <a:lstStyle/>
+          <a:p>
+            <a:pPr algn="ctr"/>
+            <a:endParaRPr lang="en-US">
+              <a:solidFill>
+                <a:schemeClr val="tx1"/>
+              </a:solidFill>
+              <a:latin typeface="Arial"/>
+              <a:cs typeface="Arial"/>
+            </a:endParaRPr>
+          </a:p>
+        </p:txBody>
+      </p:sp>
+      <p:sp>
+        <p:nvSpPr>
+          <p:cNvPr id="63" name="Rectangle 62"/>
+          <p:cNvSpPr/>
+          <p:nvPr/>
+        </p:nvSpPr>
+        <p:spPr>
+          <a:xfrm>
+            <a:off x="7904254" y="4117975"/>
+            <a:ext cx="207871" cy="510249"/>
+          </a:xfrm>
+          <a:prstGeom prst="rect">
+            <a:avLst/>
+          </a:prstGeom>
+          <a:solidFill>
+            <a:srgbClr val="7665A0"/>
+          </a:solidFill>
+          <a:ln>
+            <a:noFill/>
+          </a:ln>
+        </p:spPr>
+        <p:style>
+          <a:lnRef idx="2">
+            <a:schemeClr val="accent1">
+              <a:shade val="50000"/>
+            </a:schemeClr>
+          </a:lnRef>
+          <a:fillRef idx="1">
+            <a:schemeClr val="accent1"/>
+          </a:fillRef>
+          <a:effectRef idx="0">
+            <a:schemeClr val="accent1"/>
+          </a:effectRef>
+          <a:fontRef idx="minor">
+            <a:schemeClr val="lt1"/>
+          </a:fontRef>
+        </p:style>
+        <p:txBody>
+          <a:bodyPr lIns="75282" tIns="37640" rIns="75282" bIns="37640" rtlCol="0" anchor="ctr"/>
+          <a:lstStyle/>
+          <a:p>
+            <a:pPr algn="ctr"/>
+            <a:endParaRPr lang="en-US">
+              <a:solidFill>
+                <a:schemeClr val="tx1"/>
+              </a:solidFill>
+              <a:latin typeface="Arial"/>
+              <a:cs typeface="Arial"/>
+            </a:endParaRPr>
+          </a:p>
+        </p:txBody>
+      </p:sp>
     </p:spTree>
     <p:extLst>
       <p:ext uri="{BB962C8B-B14F-4D97-AF65-F5344CB8AC3E}">
-        <p14:creationId xmlns:p14="http://schemas.microsoft.com/office/powerpoint/2010/main" val="3472716074"/>
+        <p14:creationId xmlns:p14="http://schemas.microsoft.com/office/powerpoint/2010/main" val="873124078"/>
       </p:ext>
     </p:extLst>
   </p:cSld>
@@ -54370,6 +54683,76 @@
                                   </p:childTnLst>
                                 </p:cTn>
                               </p:par>
+                              <p:par>
+                                <p:cTn id="95" presetID="22" presetClass="entr" presetSubtype="4" fill="hold" grpId="0" nodeType="withEffect">
+                                  <p:stCondLst>
+                                    <p:cond delay="2800"/>
+                                  </p:stCondLst>
+                                  <p:childTnLst>
+                                    <p:set>
+                                      <p:cBhvr>
+                                        <p:cTn id="96" dur="1" fill="hold">
+                                          <p:stCondLst>
+                                            <p:cond delay="0"/>
+                                          </p:stCondLst>
+                                        </p:cTn>
+                                        <p:tgtEl>
+                                          <p:spTgt spid="62"/>
+                                        </p:tgtEl>
+                                        <p:attrNameLst>
+                                          <p:attrName>style.visibility</p:attrName>
+                                        </p:attrNameLst>
+                                      </p:cBhvr>
+                                      <p:to>
+                                        <p:strVal val="visible"/>
+                                      </p:to>
+                                    </p:set>
+                                    <p:animEffect transition="in" filter="wipe(down)">
+                                      <p:cBhvr>
+                                        <p:cTn id="97" dur="300"/>
+                                        <p:tgtEl>
+                                          <p:spTgt spid="62"/>
+                                        </p:tgtEl>
+                                      </p:cBhvr>
+                                    </p:animEffect>
+                                  </p:childTnLst>
+                                </p:cTn>
+                              </p:par>
+                              <p:par>
+                                <p:cTn id="98" presetID="22" presetClass="entr" presetSubtype="4" fill="hold" grpId="0" nodeType="withEffect">
+                                  <p:stCondLst>
+                                    <p:cond delay="1200"/>
+                                  </p:stCondLst>
+                                  <p:childTnLst>
+                                    <p:set>
+                                      <p:cBhvr>
+                                        <p:cTn id="99" dur="1" fill="hold">
+                                          <p:stCondLst>
+                                            <p:cond delay="0"/>
+                                          </p:stCondLst>
+                                        </p:cTn>
+                                        <p:tgtEl>
+                                          <p:spTgt spid="63"/>
+                                        </p:tgtEl>
+                                        <p:attrNameLst>
+                                          <p:attrName>style.visibility</p:attrName>
+                                        </p:attrNameLst>
+                                      </p:cBhvr>
+                                      <p:to>
+                                        <p:strVal val="visible"/>
+                                      </p:to>
+                                    </p:set>
+                                    <p:animEffect transition="in" filter="wipe(down)">
+                                      <p:cBhvr>
+                                        <p:cTn id="100" dur="200"/>
+                                        <p:tgtEl>
+                                          <p:spTgt spid="63"/>
+                                        </p:tgtEl>
+                                      </p:cBhvr>
+                                    </p:animEffect>
+                                  </p:childTnLst>
+                                </p:cTn>
+                              </p:par>
                             </p:childTnLst>
                           </p:cTn>
                         </p:par>
@@ -54426,6 +54809,8 @@
       <p:bldP spid="59" grpId="0" animBg="1"/>
       <p:bldP spid="71" grpId="0" animBg="1"/>
       <p:bldP spid="72" grpId="0" animBg="1"/>
+      <p:bldP spid="62" grpId="0" animBg="1"/>
+      <p:bldP spid="63" grpId="0" animBg="1"/>
     </p:bldLst>
   </p:timing>
 </p:sld>
@@ -54957,7 +55342,7 @@
   <a:extraClrSchemeLst/>
   <a:extLst>
     <a:ext uri="{05A4C25C-085E-4340-85A3-A5531E510DB2}">
-      <thm15:themeFamily xmlns="" xmlns:thm15="http://schemas.microsoft.com/office/thememl/2012/main" name="Office Theme" id="{62F939B6-93AF-4DB8-9C6B-D6C7DFDC589F}" vid="{4A3C46E8-61CC-4603-A589-7422A47A8E4A}"/>
+      <thm15:themeFamily xmlns:thm15="http://schemas.microsoft.com/office/thememl/2012/main" xmlns="" name="Office Theme" id="{62F939B6-93AF-4DB8-9C6B-D6C7DFDC589F}" vid="{4A3C46E8-61CC-4603-A589-7422A47A8E4A}"/>
     </a:ext>
   </a:extLst>
 </a:theme>
@@ -55259,7 +55644,7 @@
   <a:extraClrSchemeLst/>
   <a:extLst>
     <a:ext uri="{05A4C25C-085E-4340-85A3-A5531E510DB2}">
-      <thm15:themeFamily xmlns="" xmlns:thm15="http://schemas.microsoft.com/office/thememl/2012/main" name="SilverFox_Mentorship_Template" id="{726D2EC8-FE65-4BB6-9D87-EBBA7FA7A28A}" vid="{43A7A536-22B6-435A-A09C-B3CB1EAFEC96}"/>
+      <thm15:themeFamily xmlns:thm15="http://schemas.microsoft.com/office/thememl/2012/main" xmlns="" name="SilverFox_Mentorship_Template" id="{726D2EC8-FE65-4BB6-9D87-EBBA7FA7A28A}" vid="{43A7A536-22B6-435A-A09C-B3CB1EAFEC96}"/>
     </a:ext>
   </a:extLst>
 </a:theme>
@@ -55553,7 +55938,7 @@
   <a:extraClrSchemeLst/>
   <a:extLst>
     <a:ext uri="{05A4C25C-085E-4340-85A3-A5531E510DB2}">
-      <thm15:themeFamily xmlns="" xmlns:thm15="http://schemas.microsoft.com/office/thememl/2012/main" name="Office Theme" id="{62F939B6-93AF-4DB8-9C6B-D6C7DFDC589F}" vid="{4A3C46E8-61CC-4603-A589-7422A47A8E4A}"/>
+      <thm15:themeFamily xmlns:thm15="http://schemas.microsoft.com/office/thememl/2012/main" xmlns="" name="Office Theme" id="{62F939B6-93AF-4DB8-9C6B-D6C7DFDC589F}" vid="{4A3C46E8-61CC-4603-A589-7422A47A8E4A}"/>
     </a:ext>
   </a:extLst>
 </a:theme>
@@ -55814,7 +56199,7 @@
   <a:extraClrSchemeLst/>
   <a:extLst>
     <a:ext uri="{05A4C25C-085E-4340-85A3-A5531E510DB2}">
-      <thm15:themeFamily xmlns="" xmlns:thm15="http://schemas.microsoft.com/office/thememl/2012/main" name="Office Theme" id="{62F939B6-93AF-4DB8-9C6B-D6C7DFDC589F}" vid="{4A3C46E8-61CC-4603-A589-7422A47A8E4A}"/>
+      <thm15:themeFamily xmlns:thm15="http://schemas.microsoft.com/office/thememl/2012/main" xmlns="" name="Office Theme" id="{62F939B6-93AF-4DB8-9C6B-D6C7DFDC589F}" vid="{4A3C46E8-61CC-4603-A589-7422A47A8E4A}"/>
     </a:ext>
   </a:extLst>
 </a:theme>

</xml_diff>

<commit_message>
staging content changes (-robo-commit)
</commit_message>
<xml_diff>
--- a/pegasus/sites.v3/code.org/public/files/computer_science_advocacy.pptx
+++ b/pegasus/sites.v3/code.org/public/files/computer_science_advocacy.pptx
@@ -424,11 +424,11 @@
         </c:dLbls>
         <c:gapWidth val="42"/>
         <c:overlap val="100"/>
-        <c:axId val="765205736"/>
-        <c:axId val="765206520"/>
+        <c:axId val="480265424"/>
+        <c:axId val="480271304"/>
       </c:barChart>
       <c:catAx>
-        <c:axId val="765205736"/>
+        <c:axId val="480265424"/>
         <c:scaling>
           <c:orientation val="minMax"/>
         </c:scaling>
@@ -437,7 +437,7 @@
         <c:majorTickMark val="none"/>
         <c:minorTickMark val="none"/>
         <c:tickLblPos val="nextTo"/>
-        <c:crossAx val="765206520"/>
+        <c:crossAx val="480271304"/>
         <c:crosses val="autoZero"/>
         <c:auto val="0"/>
         <c:lblAlgn val="ctr"/>
@@ -445,7 +445,7 @@
         <c:noMultiLvlLbl val="0"/>
       </c:catAx>
       <c:valAx>
-        <c:axId val="765206520"/>
+        <c:axId val="480271304"/>
         <c:scaling>
           <c:orientation val="minMax"/>
           <c:max val="30000"/>
@@ -465,7 +465,7 @@
         <c:majorTickMark val="none"/>
         <c:minorTickMark val="none"/>
         <c:tickLblPos val="nextTo"/>
-        <c:crossAx val="765205736"/>
+        <c:crossAx val="480265424"/>
         <c:crosses val="autoZero"/>
         <c:crossBetween val="between"/>
       </c:valAx>
@@ -668,11 +668,11 @@
         </c:dLbls>
         <c:gapWidth val="42"/>
         <c:overlap val="100"/>
-        <c:axId val="765206912"/>
-        <c:axId val="765206128"/>
+        <c:axId val="480279928"/>
+        <c:axId val="480283064"/>
       </c:barChart>
       <c:catAx>
-        <c:axId val="765206912"/>
+        <c:axId val="480279928"/>
         <c:scaling>
           <c:orientation val="minMax"/>
         </c:scaling>
@@ -681,7 +681,7 @@
         <c:majorTickMark val="none"/>
         <c:minorTickMark val="none"/>
         <c:tickLblPos val="nextTo"/>
-        <c:crossAx val="765206128"/>
+        <c:crossAx val="480283064"/>
         <c:crosses val="autoZero"/>
         <c:auto val="1"/>
         <c:lblAlgn val="ctr"/>
@@ -689,7 +689,7 @@
         <c:noMultiLvlLbl val="0"/>
       </c:catAx>
       <c:valAx>
-        <c:axId val="765206128"/>
+        <c:axId val="480283064"/>
         <c:scaling>
           <c:orientation val="minMax"/>
         </c:scaling>
@@ -708,7 +708,7 @@
         <c:majorTickMark val="none"/>
         <c:minorTickMark val="none"/>
         <c:tickLblPos val="nextTo"/>
-        <c:crossAx val="765206912"/>
+        <c:crossAx val="480279928"/>
         <c:crosses val="autoZero"/>
         <c:crossBetween val="between"/>
       </c:valAx>
@@ -829,7 +829,7 @@
           <a:p>
             <a:fld id="{DBF07D2D-D193-49EA-AA40-D0161EE95780}" type="datetimeFigureOut">
               <a:rPr lang="en-US" smtClean="0"/>
-              <a:t>8/13/2018</a:t>
+              <a:t>8/15/2018</a:t>
             </a:fld>
             <a:endParaRPr lang="en-US"/>
           </a:p>
@@ -13045,7 +13045,7 @@
           <a:p>
             <a:fld id="{5355355A-278A-4177-940D-D180E0E2D021}" type="datetimeFigureOut">
               <a:rPr lang="en-US" smtClean="0"/>
-              <a:t>8/13/2018</a:t>
+              <a:t>8/15/2018</a:t>
             </a:fld>
             <a:endParaRPr lang="en-US"/>
           </a:p>
@@ -48852,7 +48852,7 @@
                 <a:ea typeface="Verdana" panose="020B0604030504040204" pitchFamily="34" charset="0"/>
                 <a:cs typeface="Verdana" panose="020B0604030504040204" pitchFamily="34" charset="0"/>
               </a:rPr>
-              <a:t>23 </a:t>
+              <a:t>21 </a:t>
             </a:r>
             <a:r>
               <a:rPr lang="en-US" sz="1800" b="1" dirty="0">
@@ -49652,7 +49652,7 @@
                 <a:ea typeface="Verdana" panose="020B0604030504040204" pitchFamily="34" charset="0"/>
                 <a:cs typeface="Verdana" panose="020B0604030504040204" pitchFamily="34" charset="0"/>
               </a:rPr>
-              <a:t>37 </a:t>
+              <a:t>36 </a:t>
             </a:r>
             <a:r>
               <a:rPr lang="en-US" sz="3200" b="1" dirty="0">
@@ -49734,7 +49734,7 @@
                 <a:ea typeface="Verdana" panose="020B0604030504040204" pitchFamily="34" charset="0"/>
                 <a:cs typeface="Verdana" panose="020B0604030504040204" pitchFamily="34" charset="0"/>
               </a:rPr>
-              <a:t>37 </a:t>
+              <a:t>36 </a:t>
             </a:r>
             <a:r>
               <a:rPr lang="en-US" sz="1800" dirty="0">
@@ -49771,7 +49771,7 @@
       </p:sp>
       <p:pic>
         <p:nvPicPr>
-          <p:cNvPr id="3" name="Picture 2"/>
+          <p:cNvPr id="2" name="Picture 1"/>
           <p:cNvPicPr>
             <a:picLocks noChangeAspect="1"/>
           </p:cNvPicPr>
@@ -49791,7 +49791,7 @@
         </p:blipFill>
         <p:spPr>
           <a:xfrm>
-            <a:off x="138864" y="1155934"/>
+            <a:off x="138865" y="1155934"/>
             <a:ext cx="5798749" cy="3785616"/>
           </a:xfrm>
           <a:prstGeom prst="rect">

</xml_diff>

<commit_message>
staging content changes (-suresh)
</commit_message>
<xml_diff>
--- a/pegasus/sites.v3/code.org/public/files/computer_science_advocacy.pptx
+++ b/pegasus/sites.v3/code.org/public/files/computer_science_advocacy.pptx
@@ -829,7 +829,7 @@
           <a:p>
             <a:fld id="{DBF07D2D-D193-49EA-AA40-D0161EE95780}" type="datetimeFigureOut">
               <a:rPr lang="en-US" smtClean="0"/>
-              <a:t>10/22/2018</a:t>
+              <a:t>10/31/2018</a:t>
             </a:fld>
             <a:endParaRPr lang="en-US"/>
           </a:p>
@@ -2908,7 +2908,7 @@
             </a:pPr>
             <a:r>
               <a:rPr lang="en-US" baseline="0" dirty="0"/>
-              <a:t>But school principals and superintendents tell us that fewer than half of schools actually offer computer science classes</a:t>
+              <a:t>But according to our Access Report, just 35% of high schools teach computer science courses</a:t>
             </a:r>
           </a:p>
           <a:p>
@@ -13045,7 +13045,7 @@
           <a:p>
             <a:fld id="{5355355A-278A-4177-940D-D180E0E2D021}" type="datetimeFigureOut">
               <a:rPr lang="en-US" smtClean="0"/>
-              <a:t>10/22/2018</a:t>
+              <a:t>10/31/2018</a:t>
             </a:fld>
             <a:endParaRPr lang="en-US"/>
           </a:p>
@@ -47193,14 +47193,20 @@
       </p:sp>
       <p:sp>
         <p:nvSpPr>
-          <p:cNvPr id="15" name="Rectangle 14"/>
+          <p:cNvPr id="5" name="Rectangle 4">
+            <a:extLst>
+              <a:ext uri="{FF2B5EF4-FFF2-40B4-BE49-F238E27FC236}">
+                <a16:creationId xmlns:a16="http://schemas.microsoft.com/office/drawing/2014/main" id="{E69BA116-F203-4769-84B8-1A490C88538F}"/>
+              </a:ext>
+            </a:extLst>
+          </p:cNvPr>
           <p:cNvSpPr/>
           <p:nvPr/>
         </p:nvSpPr>
         <p:spPr>
           <a:xfrm>
-            <a:off x="7657550" y="4577921"/>
-            <a:ext cx="1202578" cy="276989"/>
+            <a:off x="7333624" y="4729021"/>
+            <a:ext cx="1747076" cy="276965"/>
           </a:xfrm>
           <a:prstGeom prst="rect">
             <a:avLst/>
@@ -47226,14 +47232,20 @@
                 <a:ea typeface="Adobe Gothic Std B" panose="020B0800000000000000" pitchFamily="34" charset="-128"/>
                 <a:cs typeface="Arial"/>
               </a:rPr>
-              <a:t>Source: Gallup</a:t>
+              <a:t>Source: Access Report</a:t>
             </a:r>
           </a:p>
         </p:txBody>
       </p:sp>
       <p:pic>
         <p:nvPicPr>
-          <p:cNvPr id="2" name="Picture 1"/>
+          <p:cNvPr id="7" name="Picture 6">
+            <a:extLst>
+              <a:ext uri="{FF2B5EF4-FFF2-40B4-BE49-F238E27FC236}">
+                <a16:creationId xmlns:a16="http://schemas.microsoft.com/office/drawing/2014/main" id="{58FE9410-5CBD-445F-9361-147DAA57CF13}"/>
+              </a:ext>
+            </a:extLst>
+          </p:cNvPr>
           <p:cNvPicPr>
             <a:picLocks noChangeAspect="1"/>
           </p:cNvPicPr>
@@ -47253,8 +47265,8 @@
         </p:blipFill>
         <p:spPr>
           <a:xfrm>
-            <a:off x="916304" y="1380190"/>
-            <a:ext cx="7270323" cy="3474720"/>
+            <a:off x="918696" y="1384112"/>
+            <a:ext cx="7288466" cy="3483391"/>
           </a:xfrm>
           <a:prstGeom prst="rect">
             <a:avLst/>
@@ -49211,7 +49223,7 @@
                 <a:ea typeface="Verdana" panose="020B0604030504040204" pitchFamily="34" charset="0"/>
                 <a:cs typeface="Verdana" panose="020B0604030504040204" pitchFamily="34" charset="0"/>
               </a:rPr>
-              <a:t>39 states + DC</a:t>
+              <a:t>41 states + DC</a:t>
             </a:r>
           </a:p>
         </p:txBody>
@@ -49271,7 +49283,7 @@
                 <a:ea typeface="Verdana" panose="020B0604030504040204" pitchFamily="34" charset="0"/>
                 <a:cs typeface="Verdana" panose="020B0604030504040204" pitchFamily="34" charset="0"/>
               </a:rPr>
-              <a:t>In 39 states plus DC, computer science can count towards high school graduation math or science requirements - </a:t>
+              <a:t>In 41 states plus DC, computer science can count towards high school graduation math or science requirements - </a:t>
             </a:r>
             <a:r>
               <a:rPr lang="en-US" sz="1800" b="1" dirty="0">
@@ -49297,10 +49309,10 @@
       </p:sp>
       <p:pic>
         <p:nvPicPr>
-          <p:cNvPr id="2" name="Picture 2" descr="A close up of a map&#10;&#10;Description generated with high confidence">
+          <p:cNvPr id="14" name="Picture 13" descr="A close up of a map&#10;&#10;Description automatically generated">
             <a:extLst>
               <a:ext uri="{FF2B5EF4-FFF2-40B4-BE49-F238E27FC236}">
-                <a16:creationId xmlns:a16="http://schemas.microsoft.com/office/drawing/2014/main" id="{4FE816BF-623F-4E33-8966-DF1BBDF33522}"/>
+                <a16:creationId xmlns:a16="http://schemas.microsoft.com/office/drawing/2014/main" id="{4B09C772-5392-4F7F-AED6-C5EA2669D94B}"/>
               </a:ext>
             </a:extLst>
           </p:cNvPr>
@@ -49310,15 +49322,21 @@
           <p:nvPr/>
         </p:nvPicPr>
         <p:blipFill>
-          <a:blip r:embed="rId3"/>
+          <a:blip r:embed="rId3">
+            <a:extLst>
+              <a:ext uri="{28A0092B-C50C-407E-A947-70E740481C1C}">
+                <a14:useLocalDpi xmlns:a14="http://schemas.microsoft.com/office/drawing/2010/main" val="0"/>
+              </a:ext>
+            </a:extLst>
+          </a:blip>
           <a:stretch>
             <a:fillRect/>
           </a:stretch>
         </p:blipFill>
         <p:spPr>
           <a:xfrm>
-            <a:off x="138418" y="1162499"/>
-            <a:ext cx="5878585" cy="3840911"/>
+            <a:off x="138418" y="1172240"/>
+            <a:ext cx="5878585" cy="3837735"/>
           </a:xfrm>
           <a:prstGeom prst="rect">
             <a:avLst/>
@@ -50171,8 +50189,8 @@
         </p:nvSpPr>
         <p:spPr>
           <a:xfrm>
-            <a:off x="7657550" y="4577921"/>
-            <a:ext cx="1202578" cy="276989"/>
+            <a:off x="7333624" y="4729021"/>
+            <a:ext cx="1747076" cy="276965"/>
           </a:xfrm>
           <a:prstGeom prst="rect">
             <a:avLst/>
@@ -50198,41 +50216,11 @@
                 <a:ea typeface="Adobe Gothic Std B" panose="020B0800000000000000" pitchFamily="34" charset="-128"/>
                 <a:cs typeface="Arial"/>
               </a:rPr>
-              <a:t>Source: Gallup</a:t>
+              <a:t>Source: Access Report</a:t>
             </a:r>
           </a:p>
         </p:txBody>
       </p:sp>
-      <p:pic>
-        <p:nvPicPr>
-          <p:cNvPr id="12" name="Picture 11"/>
-          <p:cNvPicPr>
-            <a:picLocks noChangeAspect="1"/>
-          </p:cNvPicPr>
-          <p:nvPr/>
-        </p:nvPicPr>
-        <p:blipFill>
-          <a:blip r:embed="rId3">
-            <a:extLst>
-              <a:ext uri="{28A0092B-C50C-407E-A947-70E740481C1C}">
-                <a14:useLocalDpi xmlns:a14="http://schemas.microsoft.com/office/drawing/2010/main" val="0"/>
-              </a:ext>
-            </a:extLst>
-          </a:blip>
-          <a:stretch>
-            <a:fillRect/>
-          </a:stretch>
-        </p:blipFill>
-        <p:spPr>
-          <a:xfrm>
-            <a:off x="916304" y="1380190"/>
-            <a:ext cx="7270323" cy="3474720"/>
-          </a:xfrm>
-          <a:prstGeom prst="rect">
-            <a:avLst/>
-          </a:prstGeom>
-        </p:spPr>
-      </p:pic>
       <p:sp>
         <p:nvSpPr>
           <p:cNvPr id="5" name="Title 1"/>
@@ -50301,6 +50289,42 @@
           </a:p>
         </p:txBody>
       </p:sp>
+      <p:pic>
+        <p:nvPicPr>
+          <p:cNvPr id="6" name="Picture 5">
+            <a:extLst>
+              <a:ext uri="{FF2B5EF4-FFF2-40B4-BE49-F238E27FC236}">
+                <a16:creationId xmlns:a16="http://schemas.microsoft.com/office/drawing/2014/main" id="{A7618B9C-AD61-426E-976B-81F74B5533CE}"/>
+              </a:ext>
+            </a:extLst>
+          </p:cNvPr>
+          <p:cNvPicPr>
+            <a:picLocks noChangeAspect="1"/>
+          </p:cNvPicPr>
+          <p:nvPr/>
+        </p:nvPicPr>
+        <p:blipFill>
+          <a:blip r:embed="rId3">
+            <a:extLst>
+              <a:ext uri="{28A0092B-C50C-407E-A947-70E740481C1C}">
+                <a14:useLocalDpi xmlns:a14="http://schemas.microsoft.com/office/drawing/2010/main" val="0"/>
+              </a:ext>
+            </a:extLst>
+          </a:blip>
+          <a:stretch>
+            <a:fillRect/>
+          </a:stretch>
+        </p:blipFill>
+        <p:spPr>
+          <a:xfrm>
+            <a:off x="918696" y="1384112"/>
+            <a:ext cx="7288466" cy="3483391"/>
+          </a:xfrm>
+          <a:prstGeom prst="rect">
+            <a:avLst/>
+          </a:prstGeom>
+        </p:spPr>
+      </p:pic>
     </p:spTree>
     <p:extLst>
       <p:ext uri="{BB962C8B-B14F-4D97-AF65-F5344CB8AC3E}">

</xml_diff>